<commit_message>
add slides + change this slides to real PWA
</commit_message>
<xml_diff>
--- a/img/shema.pptx
+++ b/img/shema.pptx
@@ -2,14 +2,20 @@
 <file path=ppt/presentation.xml><?xml version="1.0" encoding="utf-8"?>
 <p:presentation xmlns:a="http://schemas.openxmlformats.org/drawingml/2006/main" xmlns:r="http://schemas.openxmlformats.org/officeDocument/2006/relationships" xmlns:p="http://schemas.openxmlformats.org/presentationml/2006/main" saveSubsetFonts="1" autoCompressPictures="0">
   <p:sldMasterIdLst>
-    <p:sldMasterId id="2147483648" r:id="rId1"/>
+    <p:sldMasterId id="2147483678" r:id="rId1"/>
   </p:sldMasterIdLst>
   <p:notesMasterIdLst>
-    <p:notesMasterId r:id="rId4"/>
+    <p:notesMasterId r:id="rId10"/>
   </p:notesMasterIdLst>
   <p:sldIdLst>
     <p:sldId id="258" r:id="rId2"/>
     <p:sldId id="257" r:id="rId3"/>
+    <p:sldId id="260" r:id="rId4"/>
+    <p:sldId id="262" r:id="rId5"/>
+    <p:sldId id="263" r:id="rId6"/>
+    <p:sldId id="264" r:id="rId7"/>
+    <p:sldId id="265" r:id="rId8"/>
+    <p:sldId id="266" r:id="rId9"/>
   </p:sldIdLst>
   <p:sldSz cx="12192000" cy="6858000"/>
   <p:notesSz cx="6858000" cy="9144000"/>
@@ -198,7 +204,7 @@
           <a:p>
             <a:fld id="{F9C0B1C2-39C7-B641-8A61-67DC3872B6A0}" type="datetimeFigureOut">
               <a:rPr lang="en-US" smtClean="0"/>
-              <a:t>2/23/18</a:t>
+              <a:t>2/27/18</a:t>
             </a:fld>
             <a:endParaRPr lang="en-US"/>
           </a:p>
@@ -466,6 +472,510 @@
 </p:notesMaster>
 </file>
 
+<file path=ppt/notesSlides/notesSlide1.xml><?xml version="1.0" encoding="utf-8"?>
+<p:notes xmlns:a="http://schemas.openxmlformats.org/drawingml/2006/main" xmlns:r="http://schemas.openxmlformats.org/officeDocument/2006/relationships" xmlns:p="http://schemas.openxmlformats.org/presentationml/2006/main">
+  <p:cSld>
+    <p:spTree>
+      <p:nvGrpSpPr>
+        <p:cNvPr id="1" name=""/>
+        <p:cNvGrpSpPr/>
+        <p:nvPr/>
+      </p:nvGrpSpPr>
+      <p:grpSpPr>
+        <a:xfrm>
+          <a:off x="0" y="0"/>
+          <a:ext cx="0" cy="0"/>
+          <a:chOff x="0" y="0"/>
+          <a:chExt cx="0" cy="0"/>
+        </a:xfrm>
+      </p:grpSpPr>
+      <p:sp>
+        <p:nvSpPr>
+          <p:cNvPr id="2" name="Slide Image Placeholder 1"/>
+          <p:cNvSpPr>
+            <a:spLocks noGrp="1" noRot="1" noChangeAspect="1"/>
+          </p:cNvSpPr>
+          <p:nvPr>
+            <p:ph type="sldImg"/>
+          </p:nvPr>
+        </p:nvSpPr>
+        <p:spPr/>
+      </p:sp>
+      <p:sp>
+        <p:nvSpPr>
+          <p:cNvPr id="3" name="Notes Placeholder 2"/>
+          <p:cNvSpPr>
+            <a:spLocks noGrp="1"/>
+          </p:cNvSpPr>
+          <p:nvPr>
+            <p:ph type="body" idx="1"/>
+          </p:nvPr>
+        </p:nvSpPr>
+        <p:spPr/>
+        <p:txBody>
+          <a:bodyPr/>
+          <a:lstStyle/>
+          <a:p>
+            <a:endParaRPr lang="en-US" dirty="0"/>
+          </a:p>
+        </p:txBody>
+      </p:sp>
+      <p:sp>
+        <p:nvSpPr>
+          <p:cNvPr id="4" name="Slide Number Placeholder 3"/>
+          <p:cNvSpPr>
+            <a:spLocks noGrp="1"/>
+          </p:cNvSpPr>
+          <p:nvPr>
+            <p:ph type="sldNum" sz="quarter" idx="10"/>
+          </p:nvPr>
+        </p:nvSpPr>
+        <p:spPr/>
+        <p:txBody>
+          <a:bodyPr/>
+          <a:lstStyle/>
+          <a:p>
+            <a:fld id="{CC89EB1C-5E3C-1C4E-8EDB-99FD9D6805E9}" type="slidenum">
+              <a:rPr lang="en-US" smtClean="0"/>
+              <a:t>3</a:t>
+            </a:fld>
+            <a:endParaRPr lang="en-US"/>
+          </a:p>
+        </p:txBody>
+      </p:sp>
+    </p:spTree>
+    <p:extLst>
+      <p:ext uri="{BB962C8B-B14F-4D97-AF65-F5344CB8AC3E}">
+        <p14:creationId xmlns:p14="http://schemas.microsoft.com/office/powerpoint/2010/main" val="202463181"/>
+      </p:ext>
+    </p:extLst>
+  </p:cSld>
+  <p:clrMapOvr>
+    <a:masterClrMapping/>
+  </p:clrMapOvr>
+</p:notes>
+</file>
+
+<file path=ppt/notesSlides/notesSlide2.xml><?xml version="1.0" encoding="utf-8"?>
+<p:notes xmlns:a="http://schemas.openxmlformats.org/drawingml/2006/main" xmlns:r="http://schemas.openxmlformats.org/officeDocument/2006/relationships" xmlns:p="http://schemas.openxmlformats.org/presentationml/2006/main">
+  <p:cSld>
+    <p:spTree>
+      <p:nvGrpSpPr>
+        <p:cNvPr id="1" name=""/>
+        <p:cNvGrpSpPr/>
+        <p:nvPr/>
+      </p:nvGrpSpPr>
+      <p:grpSpPr>
+        <a:xfrm>
+          <a:off x="0" y="0"/>
+          <a:ext cx="0" cy="0"/>
+          <a:chOff x="0" y="0"/>
+          <a:chExt cx="0" cy="0"/>
+        </a:xfrm>
+      </p:grpSpPr>
+      <p:sp>
+        <p:nvSpPr>
+          <p:cNvPr id="2" name="Slide Image Placeholder 1"/>
+          <p:cNvSpPr>
+            <a:spLocks noGrp="1" noRot="1" noChangeAspect="1"/>
+          </p:cNvSpPr>
+          <p:nvPr>
+            <p:ph type="sldImg"/>
+          </p:nvPr>
+        </p:nvSpPr>
+        <p:spPr/>
+      </p:sp>
+      <p:sp>
+        <p:nvSpPr>
+          <p:cNvPr id="3" name="Notes Placeholder 2"/>
+          <p:cNvSpPr>
+            <a:spLocks noGrp="1"/>
+          </p:cNvSpPr>
+          <p:nvPr>
+            <p:ph type="body" idx="1"/>
+          </p:nvPr>
+        </p:nvSpPr>
+        <p:spPr/>
+        <p:txBody>
+          <a:bodyPr/>
+          <a:lstStyle/>
+          <a:p>
+            <a:endParaRPr lang="en-US" dirty="0"/>
+          </a:p>
+        </p:txBody>
+      </p:sp>
+      <p:sp>
+        <p:nvSpPr>
+          <p:cNvPr id="4" name="Slide Number Placeholder 3"/>
+          <p:cNvSpPr>
+            <a:spLocks noGrp="1"/>
+          </p:cNvSpPr>
+          <p:nvPr>
+            <p:ph type="sldNum" sz="quarter" idx="10"/>
+          </p:nvPr>
+        </p:nvSpPr>
+        <p:spPr/>
+        <p:txBody>
+          <a:bodyPr/>
+          <a:lstStyle/>
+          <a:p>
+            <a:fld id="{CC89EB1C-5E3C-1C4E-8EDB-99FD9D6805E9}" type="slidenum">
+              <a:rPr lang="en-US" smtClean="0"/>
+              <a:t>4</a:t>
+            </a:fld>
+            <a:endParaRPr lang="en-US"/>
+          </a:p>
+        </p:txBody>
+      </p:sp>
+    </p:spTree>
+    <p:extLst>
+      <p:ext uri="{BB962C8B-B14F-4D97-AF65-F5344CB8AC3E}">
+        <p14:creationId xmlns:p14="http://schemas.microsoft.com/office/powerpoint/2010/main" val="2083664617"/>
+      </p:ext>
+    </p:extLst>
+  </p:cSld>
+  <p:clrMapOvr>
+    <a:masterClrMapping/>
+  </p:clrMapOvr>
+</p:notes>
+</file>
+
+<file path=ppt/notesSlides/notesSlide3.xml><?xml version="1.0" encoding="utf-8"?>
+<p:notes xmlns:a="http://schemas.openxmlformats.org/drawingml/2006/main" xmlns:r="http://schemas.openxmlformats.org/officeDocument/2006/relationships" xmlns:p="http://schemas.openxmlformats.org/presentationml/2006/main">
+  <p:cSld>
+    <p:spTree>
+      <p:nvGrpSpPr>
+        <p:cNvPr id="1" name=""/>
+        <p:cNvGrpSpPr/>
+        <p:nvPr/>
+      </p:nvGrpSpPr>
+      <p:grpSpPr>
+        <a:xfrm>
+          <a:off x="0" y="0"/>
+          <a:ext cx="0" cy="0"/>
+          <a:chOff x="0" y="0"/>
+          <a:chExt cx="0" cy="0"/>
+        </a:xfrm>
+      </p:grpSpPr>
+      <p:sp>
+        <p:nvSpPr>
+          <p:cNvPr id="2" name="Slide Image Placeholder 1"/>
+          <p:cNvSpPr>
+            <a:spLocks noGrp="1" noRot="1" noChangeAspect="1"/>
+          </p:cNvSpPr>
+          <p:nvPr>
+            <p:ph type="sldImg"/>
+          </p:nvPr>
+        </p:nvSpPr>
+        <p:spPr/>
+      </p:sp>
+      <p:sp>
+        <p:nvSpPr>
+          <p:cNvPr id="3" name="Notes Placeholder 2"/>
+          <p:cNvSpPr>
+            <a:spLocks noGrp="1"/>
+          </p:cNvSpPr>
+          <p:nvPr>
+            <p:ph type="body" idx="1"/>
+          </p:nvPr>
+        </p:nvSpPr>
+        <p:spPr/>
+        <p:txBody>
+          <a:bodyPr/>
+          <a:lstStyle/>
+          <a:p>
+            <a:endParaRPr lang="en-US" dirty="0"/>
+          </a:p>
+        </p:txBody>
+      </p:sp>
+      <p:sp>
+        <p:nvSpPr>
+          <p:cNvPr id="4" name="Slide Number Placeholder 3"/>
+          <p:cNvSpPr>
+            <a:spLocks noGrp="1"/>
+          </p:cNvSpPr>
+          <p:nvPr>
+            <p:ph type="sldNum" sz="quarter" idx="10"/>
+          </p:nvPr>
+        </p:nvSpPr>
+        <p:spPr/>
+        <p:txBody>
+          <a:bodyPr/>
+          <a:lstStyle/>
+          <a:p>
+            <a:fld id="{CC89EB1C-5E3C-1C4E-8EDB-99FD9D6805E9}" type="slidenum">
+              <a:rPr lang="en-US" smtClean="0"/>
+              <a:t>5</a:t>
+            </a:fld>
+            <a:endParaRPr lang="en-US"/>
+          </a:p>
+        </p:txBody>
+      </p:sp>
+    </p:spTree>
+    <p:extLst>
+      <p:ext uri="{BB962C8B-B14F-4D97-AF65-F5344CB8AC3E}">
+        <p14:creationId xmlns:p14="http://schemas.microsoft.com/office/powerpoint/2010/main" val="1012051989"/>
+      </p:ext>
+    </p:extLst>
+  </p:cSld>
+  <p:clrMapOvr>
+    <a:masterClrMapping/>
+  </p:clrMapOvr>
+</p:notes>
+</file>
+
+<file path=ppt/notesSlides/notesSlide4.xml><?xml version="1.0" encoding="utf-8"?>
+<p:notes xmlns:a="http://schemas.openxmlformats.org/drawingml/2006/main" xmlns:r="http://schemas.openxmlformats.org/officeDocument/2006/relationships" xmlns:p="http://schemas.openxmlformats.org/presentationml/2006/main">
+  <p:cSld>
+    <p:spTree>
+      <p:nvGrpSpPr>
+        <p:cNvPr id="1" name=""/>
+        <p:cNvGrpSpPr/>
+        <p:nvPr/>
+      </p:nvGrpSpPr>
+      <p:grpSpPr>
+        <a:xfrm>
+          <a:off x="0" y="0"/>
+          <a:ext cx="0" cy="0"/>
+          <a:chOff x="0" y="0"/>
+          <a:chExt cx="0" cy="0"/>
+        </a:xfrm>
+      </p:grpSpPr>
+      <p:sp>
+        <p:nvSpPr>
+          <p:cNvPr id="2" name="Slide Image Placeholder 1"/>
+          <p:cNvSpPr>
+            <a:spLocks noGrp="1" noRot="1" noChangeAspect="1"/>
+          </p:cNvSpPr>
+          <p:nvPr>
+            <p:ph type="sldImg"/>
+          </p:nvPr>
+        </p:nvSpPr>
+        <p:spPr/>
+      </p:sp>
+      <p:sp>
+        <p:nvSpPr>
+          <p:cNvPr id="3" name="Notes Placeholder 2"/>
+          <p:cNvSpPr>
+            <a:spLocks noGrp="1"/>
+          </p:cNvSpPr>
+          <p:nvPr>
+            <p:ph type="body" idx="1"/>
+          </p:nvPr>
+        </p:nvSpPr>
+        <p:spPr/>
+        <p:txBody>
+          <a:bodyPr/>
+          <a:lstStyle/>
+          <a:p>
+            <a:endParaRPr lang="en-US" dirty="0"/>
+          </a:p>
+        </p:txBody>
+      </p:sp>
+      <p:sp>
+        <p:nvSpPr>
+          <p:cNvPr id="4" name="Slide Number Placeholder 3"/>
+          <p:cNvSpPr>
+            <a:spLocks noGrp="1"/>
+          </p:cNvSpPr>
+          <p:nvPr>
+            <p:ph type="sldNum" sz="quarter" idx="10"/>
+          </p:nvPr>
+        </p:nvSpPr>
+        <p:spPr/>
+        <p:txBody>
+          <a:bodyPr/>
+          <a:lstStyle/>
+          <a:p>
+            <a:fld id="{CC89EB1C-5E3C-1C4E-8EDB-99FD9D6805E9}" type="slidenum">
+              <a:rPr lang="en-US" smtClean="0"/>
+              <a:t>6</a:t>
+            </a:fld>
+            <a:endParaRPr lang="en-US"/>
+          </a:p>
+        </p:txBody>
+      </p:sp>
+    </p:spTree>
+    <p:extLst>
+      <p:ext uri="{BB962C8B-B14F-4D97-AF65-F5344CB8AC3E}">
+        <p14:creationId xmlns:p14="http://schemas.microsoft.com/office/powerpoint/2010/main" val="1930340372"/>
+      </p:ext>
+    </p:extLst>
+  </p:cSld>
+  <p:clrMapOvr>
+    <a:masterClrMapping/>
+  </p:clrMapOvr>
+</p:notes>
+</file>
+
+<file path=ppt/notesSlides/notesSlide5.xml><?xml version="1.0" encoding="utf-8"?>
+<p:notes xmlns:a="http://schemas.openxmlformats.org/drawingml/2006/main" xmlns:r="http://schemas.openxmlformats.org/officeDocument/2006/relationships" xmlns:p="http://schemas.openxmlformats.org/presentationml/2006/main">
+  <p:cSld>
+    <p:spTree>
+      <p:nvGrpSpPr>
+        <p:cNvPr id="1" name=""/>
+        <p:cNvGrpSpPr/>
+        <p:nvPr/>
+      </p:nvGrpSpPr>
+      <p:grpSpPr>
+        <a:xfrm>
+          <a:off x="0" y="0"/>
+          <a:ext cx="0" cy="0"/>
+          <a:chOff x="0" y="0"/>
+          <a:chExt cx="0" cy="0"/>
+        </a:xfrm>
+      </p:grpSpPr>
+      <p:sp>
+        <p:nvSpPr>
+          <p:cNvPr id="2" name="Slide Image Placeholder 1"/>
+          <p:cNvSpPr>
+            <a:spLocks noGrp="1" noRot="1" noChangeAspect="1"/>
+          </p:cNvSpPr>
+          <p:nvPr>
+            <p:ph type="sldImg"/>
+          </p:nvPr>
+        </p:nvSpPr>
+        <p:spPr/>
+      </p:sp>
+      <p:sp>
+        <p:nvSpPr>
+          <p:cNvPr id="3" name="Notes Placeholder 2"/>
+          <p:cNvSpPr>
+            <a:spLocks noGrp="1"/>
+          </p:cNvSpPr>
+          <p:nvPr>
+            <p:ph type="body" idx="1"/>
+          </p:nvPr>
+        </p:nvSpPr>
+        <p:spPr/>
+        <p:txBody>
+          <a:bodyPr/>
+          <a:lstStyle/>
+          <a:p>
+            <a:endParaRPr lang="en-US" dirty="0"/>
+          </a:p>
+        </p:txBody>
+      </p:sp>
+      <p:sp>
+        <p:nvSpPr>
+          <p:cNvPr id="4" name="Slide Number Placeholder 3"/>
+          <p:cNvSpPr>
+            <a:spLocks noGrp="1"/>
+          </p:cNvSpPr>
+          <p:nvPr>
+            <p:ph type="sldNum" sz="quarter" idx="10"/>
+          </p:nvPr>
+        </p:nvSpPr>
+        <p:spPr/>
+        <p:txBody>
+          <a:bodyPr/>
+          <a:lstStyle/>
+          <a:p>
+            <a:fld id="{CC89EB1C-5E3C-1C4E-8EDB-99FD9D6805E9}" type="slidenum">
+              <a:rPr lang="en-US" smtClean="0"/>
+              <a:t>7</a:t>
+            </a:fld>
+            <a:endParaRPr lang="en-US"/>
+          </a:p>
+        </p:txBody>
+      </p:sp>
+    </p:spTree>
+    <p:extLst>
+      <p:ext uri="{BB962C8B-B14F-4D97-AF65-F5344CB8AC3E}">
+        <p14:creationId xmlns:p14="http://schemas.microsoft.com/office/powerpoint/2010/main" val="208876026"/>
+      </p:ext>
+    </p:extLst>
+  </p:cSld>
+  <p:clrMapOvr>
+    <a:masterClrMapping/>
+  </p:clrMapOvr>
+</p:notes>
+</file>
+
+<file path=ppt/notesSlides/notesSlide6.xml><?xml version="1.0" encoding="utf-8"?>
+<p:notes xmlns:a="http://schemas.openxmlformats.org/drawingml/2006/main" xmlns:r="http://schemas.openxmlformats.org/officeDocument/2006/relationships" xmlns:p="http://schemas.openxmlformats.org/presentationml/2006/main">
+  <p:cSld>
+    <p:spTree>
+      <p:nvGrpSpPr>
+        <p:cNvPr id="1" name=""/>
+        <p:cNvGrpSpPr/>
+        <p:nvPr/>
+      </p:nvGrpSpPr>
+      <p:grpSpPr>
+        <a:xfrm>
+          <a:off x="0" y="0"/>
+          <a:ext cx="0" cy="0"/>
+          <a:chOff x="0" y="0"/>
+          <a:chExt cx="0" cy="0"/>
+        </a:xfrm>
+      </p:grpSpPr>
+      <p:sp>
+        <p:nvSpPr>
+          <p:cNvPr id="2" name="Slide Image Placeholder 1"/>
+          <p:cNvSpPr>
+            <a:spLocks noGrp="1" noRot="1" noChangeAspect="1"/>
+          </p:cNvSpPr>
+          <p:nvPr>
+            <p:ph type="sldImg"/>
+          </p:nvPr>
+        </p:nvSpPr>
+        <p:spPr/>
+      </p:sp>
+      <p:sp>
+        <p:nvSpPr>
+          <p:cNvPr id="3" name="Notes Placeholder 2"/>
+          <p:cNvSpPr>
+            <a:spLocks noGrp="1"/>
+          </p:cNvSpPr>
+          <p:nvPr>
+            <p:ph type="body" idx="1"/>
+          </p:nvPr>
+        </p:nvSpPr>
+        <p:spPr/>
+        <p:txBody>
+          <a:bodyPr/>
+          <a:lstStyle/>
+          <a:p>
+            <a:endParaRPr lang="en-US" dirty="0"/>
+          </a:p>
+        </p:txBody>
+      </p:sp>
+      <p:sp>
+        <p:nvSpPr>
+          <p:cNvPr id="4" name="Slide Number Placeholder 3"/>
+          <p:cNvSpPr>
+            <a:spLocks noGrp="1"/>
+          </p:cNvSpPr>
+          <p:nvPr>
+            <p:ph type="sldNum" sz="quarter" idx="10"/>
+          </p:nvPr>
+        </p:nvSpPr>
+        <p:spPr/>
+        <p:txBody>
+          <a:bodyPr/>
+          <a:lstStyle/>
+          <a:p>
+            <a:fld id="{CC89EB1C-5E3C-1C4E-8EDB-99FD9D6805E9}" type="slidenum">
+              <a:rPr lang="en-US" smtClean="0"/>
+              <a:t>8</a:t>
+            </a:fld>
+            <a:endParaRPr lang="en-US"/>
+          </a:p>
+        </p:txBody>
+      </p:sp>
+    </p:spTree>
+    <p:extLst>
+      <p:ext uri="{BB962C8B-B14F-4D97-AF65-F5344CB8AC3E}">
+        <p14:creationId xmlns:p14="http://schemas.microsoft.com/office/powerpoint/2010/main" val="1166496952"/>
+      </p:ext>
+    </p:extLst>
+  </p:cSld>
+  <p:clrMapOvr>
+    <a:masterClrMapping/>
+  </p:clrMapOvr>
+</p:notes>
+</file>
+
 <file path=ppt/slideLayouts/slideLayout1.xml><?xml version="1.0" encoding="utf-8"?>
 <p:sldLayout xmlns:a="http://schemas.openxmlformats.org/drawingml/2006/main" xmlns:r="http://schemas.openxmlformats.org/officeDocument/2006/relationships" xmlns:p="http://schemas.openxmlformats.org/presentationml/2006/main" type="title" preserve="1">
   <p:cSld name="Title Slide">
@@ -597,7 +1107,7 @@
           <a:p>
             <a:fld id="{9D1EC080-B144-1F45-8AE4-77E806963AF4}" type="datetimeFigureOut">
               <a:rPr lang="en-US" smtClean="0"/>
-              <a:t>2/23/18</a:t>
+              <a:t>2/27/18</a:t>
             </a:fld>
             <a:endParaRPr lang="en-US"/>
           </a:p>
@@ -646,11 +1156,6 @@
         </p:txBody>
       </p:sp>
     </p:spTree>
-    <p:extLst>
-      <p:ext uri="{BB962C8B-B14F-4D97-AF65-F5344CB8AC3E}">
-        <p14:creationId xmlns:p14="http://schemas.microsoft.com/office/powerpoint/2010/main" val="667334050"/>
-      </p:ext>
-    </p:extLst>
   </p:cSld>
   <p:clrMapOvr>
     <a:masterClrMapping/>
@@ -767,7 +1272,7 @@
           <a:p>
             <a:fld id="{9D1EC080-B144-1F45-8AE4-77E806963AF4}" type="datetimeFigureOut">
               <a:rPr lang="en-US" smtClean="0"/>
-              <a:t>2/23/18</a:t>
+              <a:t>2/27/18</a:t>
             </a:fld>
             <a:endParaRPr lang="en-US"/>
           </a:p>
@@ -816,11 +1321,6 @@
         </p:txBody>
       </p:sp>
     </p:spTree>
-    <p:extLst>
-      <p:ext uri="{BB962C8B-B14F-4D97-AF65-F5344CB8AC3E}">
-        <p14:creationId xmlns:p14="http://schemas.microsoft.com/office/powerpoint/2010/main" val="1411734363"/>
-      </p:ext>
-    </p:extLst>
   </p:cSld>
   <p:clrMapOvr>
     <a:masterClrMapping/>
@@ -947,7 +1447,7 @@
           <a:p>
             <a:fld id="{9D1EC080-B144-1F45-8AE4-77E806963AF4}" type="datetimeFigureOut">
               <a:rPr lang="en-US" smtClean="0"/>
-              <a:t>2/23/18</a:t>
+              <a:t>2/27/18</a:t>
             </a:fld>
             <a:endParaRPr lang="en-US"/>
           </a:p>
@@ -996,11 +1496,6 @@
         </p:txBody>
       </p:sp>
     </p:spTree>
-    <p:extLst>
-      <p:ext uri="{BB962C8B-B14F-4D97-AF65-F5344CB8AC3E}">
-        <p14:creationId xmlns:p14="http://schemas.microsoft.com/office/powerpoint/2010/main" val="1620106885"/>
-      </p:ext>
-    </p:extLst>
   </p:cSld>
   <p:clrMapOvr>
     <a:masterClrMapping/>
@@ -1117,7 +1612,7 @@
           <a:p>
             <a:fld id="{9D1EC080-B144-1F45-8AE4-77E806963AF4}" type="datetimeFigureOut">
               <a:rPr lang="en-US" smtClean="0"/>
-              <a:t>2/23/18</a:t>
+              <a:t>2/27/18</a:t>
             </a:fld>
             <a:endParaRPr lang="en-US"/>
           </a:p>
@@ -1166,11 +1661,6 @@
         </p:txBody>
       </p:sp>
     </p:spTree>
-    <p:extLst>
-      <p:ext uri="{BB962C8B-B14F-4D97-AF65-F5344CB8AC3E}">
-        <p14:creationId xmlns:p14="http://schemas.microsoft.com/office/powerpoint/2010/main" val="1723773716"/>
-      </p:ext>
-    </p:extLst>
   </p:cSld>
   <p:clrMapOvr>
     <a:masterClrMapping/>
@@ -1363,7 +1853,7 @@
           <a:p>
             <a:fld id="{9D1EC080-B144-1F45-8AE4-77E806963AF4}" type="datetimeFigureOut">
               <a:rPr lang="en-US" smtClean="0"/>
-              <a:t>2/23/18</a:t>
+              <a:t>2/27/18</a:t>
             </a:fld>
             <a:endParaRPr lang="en-US"/>
           </a:p>
@@ -1412,11 +1902,6 @@
         </p:txBody>
       </p:sp>
     </p:spTree>
-    <p:extLst>
-      <p:ext uri="{BB962C8B-B14F-4D97-AF65-F5344CB8AC3E}">
-        <p14:creationId xmlns:p14="http://schemas.microsoft.com/office/powerpoint/2010/main" val="1910446782"/>
-      </p:ext>
-    </p:extLst>
   </p:cSld>
   <p:clrMapOvr>
     <a:masterClrMapping/>
@@ -1595,7 +2080,7 @@
           <a:p>
             <a:fld id="{9D1EC080-B144-1F45-8AE4-77E806963AF4}" type="datetimeFigureOut">
               <a:rPr lang="en-US" smtClean="0"/>
-              <a:t>2/23/18</a:t>
+              <a:t>2/27/18</a:t>
             </a:fld>
             <a:endParaRPr lang="en-US"/>
           </a:p>
@@ -1644,11 +2129,6 @@
         </p:txBody>
       </p:sp>
     </p:spTree>
-    <p:extLst>
-      <p:ext uri="{BB962C8B-B14F-4D97-AF65-F5344CB8AC3E}">
-        <p14:creationId xmlns:p14="http://schemas.microsoft.com/office/powerpoint/2010/main" val="1851058777"/>
-      </p:ext>
-    </p:extLst>
   </p:cSld>
   <p:clrMapOvr>
     <a:masterClrMapping/>
@@ -1962,7 +2442,7 @@
           <a:p>
             <a:fld id="{9D1EC080-B144-1F45-8AE4-77E806963AF4}" type="datetimeFigureOut">
               <a:rPr lang="en-US" smtClean="0"/>
-              <a:t>2/23/18</a:t>
+              <a:t>2/27/18</a:t>
             </a:fld>
             <a:endParaRPr lang="en-US"/>
           </a:p>
@@ -2011,11 +2491,6 @@
         </p:txBody>
       </p:sp>
     </p:spTree>
-    <p:extLst>
-      <p:ext uri="{BB962C8B-B14F-4D97-AF65-F5344CB8AC3E}">
-        <p14:creationId xmlns:p14="http://schemas.microsoft.com/office/powerpoint/2010/main" val="149270950"/>
-      </p:ext>
-    </p:extLst>
   </p:cSld>
   <p:clrMapOvr>
     <a:masterClrMapping/>
@@ -2080,7 +2555,7 @@
           <a:p>
             <a:fld id="{9D1EC080-B144-1F45-8AE4-77E806963AF4}" type="datetimeFigureOut">
               <a:rPr lang="en-US" smtClean="0"/>
-              <a:t>2/23/18</a:t>
+              <a:t>2/27/18</a:t>
             </a:fld>
             <a:endParaRPr lang="en-US"/>
           </a:p>
@@ -2129,11 +2604,6 @@
         </p:txBody>
       </p:sp>
     </p:spTree>
-    <p:extLst>
-      <p:ext uri="{BB962C8B-B14F-4D97-AF65-F5344CB8AC3E}">
-        <p14:creationId xmlns:p14="http://schemas.microsoft.com/office/powerpoint/2010/main" val="535956954"/>
-      </p:ext>
-    </p:extLst>
   </p:cSld>
   <p:clrMapOvr>
     <a:masterClrMapping/>
@@ -2175,7 +2645,7 @@
           <a:p>
             <a:fld id="{9D1EC080-B144-1F45-8AE4-77E806963AF4}" type="datetimeFigureOut">
               <a:rPr lang="en-US" smtClean="0"/>
-              <a:t>2/23/18</a:t>
+              <a:t>2/27/18</a:t>
             </a:fld>
             <a:endParaRPr lang="en-US"/>
           </a:p>
@@ -2224,11 +2694,6 @@
         </p:txBody>
       </p:sp>
     </p:spTree>
-    <p:extLst>
-      <p:ext uri="{BB962C8B-B14F-4D97-AF65-F5344CB8AC3E}">
-        <p14:creationId xmlns:p14="http://schemas.microsoft.com/office/powerpoint/2010/main" val="1282110360"/>
-      </p:ext>
-    </p:extLst>
   </p:cSld>
   <p:clrMapOvr>
     <a:masterClrMapping/>
@@ -2452,7 +2917,7 @@
           <a:p>
             <a:fld id="{9D1EC080-B144-1F45-8AE4-77E806963AF4}" type="datetimeFigureOut">
               <a:rPr lang="en-US" smtClean="0"/>
-              <a:t>2/23/18</a:t>
+              <a:t>2/27/18</a:t>
             </a:fld>
             <a:endParaRPr lang="en-US"/>
           </a:p>
@@ -2501,11 +2966,6 @@
         </p:txBody>
       </p:sp>
     </p:spTree>
-    <p:extLst>
-      <p:ext uri="{BB962C8B-B14F-4D97-AF65-F5344CB8AC3E}">
-        <p14:creationId xmlns:p14="http://schemas.microsoft.com/office/powerpoint/2010/main" val="577906522"/>
-      </p:ext>
-    </p:extLst>
   </p:cSld>
   <p:clrMapOvr>
     <a:masterClrMapping/>
@@ -2705,7 +3165,7 @@
           <a:p>
             <a:fld id="{9D1EC080-B144-1F45-8AE4-77E806963AF4}" type="datetimeFigureOut">
               <a:rPr lang="en-US" smtClean="0"/>
-              <a:t>2/23/18</a:t>
+              <a:t>2/27/18</a:t>
             </a:fld>
             <a:endParaRPr lang="en-US"/>
           </a:p>
@@ -2754,11 +3214,6 @@
         </p:txBody>
       </p:sp>
     </p:spTree>
-    <p:extLst>
-      <p:ext uri="{BB962C8B-B14F-4D97-AF65-F5344CB8AC3E}">
-        <p14:creationId xmlns:p14="http://schemas.microsoft.com/office/powerpoint/2010/main" val="1953863520"/>
-      </p:ext>
-    </p:extLst>
   </p:cSld>
   <p:clrMapOvr>
     <a:masterClrMapping/>
@@ -2918,7 +3373,7 @@
           <a:p>
             <a:fld id="{9D1EC080-B144-1F45-8AE4-77E806963AF4}" type="datetimeFigureOut">
               <a:rPr lang="en-US" smtClean="0"/>
-              <a:t>2/23/18</a:t>
+              <a:t>2/27/18</a:t>
             </a:fld>
             <a:endParaRPr lang="en-US"/>
           </a:p>
@@ -3005,23 +3460,23 @@
     </p:spTree>
     <p:extLst>
       <p:ext uri="{BB962C8B-B14F-4D97-AF65-F5344CB8AC3E}">
-        <p14:creationId xmlns:p14="http://schemas.microsoft.com/office/powerpoint/2010/main" val="839253878"/>
+        <p14:creationId xmlns:p14="http://schemas.microsoft.com/office/powerpoint/2010/main" val="2092621667"/>
       </p:ext>
     </p:extLst>
   </p:cSld>
   <p:clrMap bg1="lt1" tx1="dk1" bg2="lt2" tx2="dk2" accent1="accent1" accent2="accent2" accent3="accent3" accent4="accent4" accent5="accent5" accent6="accent6" hlink="hlink" folHlink="folHlink"/>
   <p:sldLayoutIdLst>
-    <p:sldLayoutId id="2147483649" r:id="rId1"/>
-    <p:sldLayoutId id="2147483650" r:id="rId2"/>
-    <p:sldLayoutId id="2147483651" r:id="rId3"/>
-    <p:sldLayoutId id="2147483652" r:id="rId4"/>
-    <p:sldLayoutId id="2147483653" r:id="rId5"/>
-    <p:sldLayoutId id="2147483654" r:id="rId6"/>
-    <p:sldLayoutId id="2147483655" r:id="rId7"/>
-    <p:sldLayoutId id="2147483656" r:id="rId8"/>
-    <p:sldLayoutId id="2147483657" r:id="rId9"/>
-    <p:sldLayoutId id="2147483658" r:id="rId10"/>
-    <p:sldLayoutId id="2147483659" r:id="rId11"/>
+    <p:sldLayoutId id="2147483679" r:id="rId1"/>
+    <p:sldLayoutId id="2147483680" r:id="rId2"/>
+    <p:sldLayoutId id="2147483681" r:id="rId3"/>
+    <p:sldLayoutId id="2147483682" r:id="rId4"/>
+    <p:sldLayoutId id="2147483683" r:id="rId5"/>
+    <p:sldLayoutId id="2147483684" r:id="rId6"/>
+    <p:sldLayoutId id="2147483685" r:id="rId7"/>
+    <p:sldLayoutId id="2147483686" r:id="rId8"/>
+    <p:sldLayoutId id="2147483687" r:id="rId9"/>
+    <p:sldLayoutId id="2147483688" r:id="rId10"/>
+    <p:sldLayoutId id="2147483689" r:id="rId11"/>
   </p:sldLayoutIdLst>
   <p:txStyles>
     <p:titleStyle>
@@ -3991,6 +4446,3699 @@
       </p:par>
     </p:tnLst>
   </p:timing>
+</p:sld>
+</file>
+
+<file path=ppt/slides/slide3.xml><?xml version="1.0" encoding="utf-8"?>
+<p:sld xmlns:a="http://schemas.openxmlformats.org/drawingml/2006/main" xmlns:r="http://schemas.openxmlformats.org/officeDocument/2006/relationships" xmlns:p="http://schemas.openxmlformats.org/presentationml/2006/main">
+  <p:cSld>
+    <p:bg>
+      <p:bgPr>
+        <a:solidFill>
+          <a:schemeClr val="accent5"/>
+        </a:solidFill>
+        <a:effectLst/>
+      </p:bgPr>
+    </p:bg>
+    <p:spTree>
+      <p:nvGrpSpPr>
+        <p:cNvPr id="1" name=""/>
+        <p:cNvGrpSpPr/>
+        <p:nvPr/>
+      </p:nvGrpSpPr>
+      <p:grpSpPr>
+        <a:xfrm>
+          <a:off x="0" y="0"/>
+          <a:ext cx="0" cy="0"/>
+          <a:chOff x="0" y="0"/>
+          <a:chExt cx="0" cy="0"/>
+        </a:xfrm>
+      </p:grpSpPr>
+      <p:pic>
+        <p:nvPicPr>
+          <p:cNvPr id="8" name="Picture 7"/>
+          <p:cNvPicPr>
+            <a:picLocks noChangeAspect="1"/>
+          </p:cNvPicPr>
+          <p:nvPr/>
+        </p:nvPicPr>
+        <p:blipFill>
+          <a:blip r:embed="rId3">
+            <a:extLst>
+              <a:ext uri="{28A0092B-C50C-407E-A947-70E740481C1C}">
+                <a14:useLocalDpi xmlns:a14="http://schemas.microsoft.com/office/drawing/2010/main" val="0"/>
+              </a:ext>
+            </a:extLst>
+          </a:blip>
+          <a:stretch>
+            <a:fillRect/>
+          </a:stretch>
+        </p:blipFill>
+        <p:spPr>
+          <a:xfrm>
+            <a:off x="5299072" y="4324352"/>
+            <a:ext cx="1080000" cy="1080000"/>
+          </a:xfrm>
+          <a:prstGeom prst="rect">
+            <a:avLst/>
+          </a:prstGeom>
+        </p:spPr>
+      </p:pic>
+      <p:pic>
+        <p:nvPicPr>
+          <p:cNvPr id="10" name="Picture 9"/>
+          <p:cNvPicPr>
+            <a:picLocks noChangeAspect="1"/>
+          </p:cNvPicPr>
+          <p:nvPr/>
+        </p:nvPicPr>
+        <p:blipFill>
+          <a:blip r:embed="rId4">
+            <a:extLst>
+              <a:ext uri="{28A0092B-C50C-407E-A947-70E740481C1C}">
+                <a14:useLocalDpi xmlns:a14="http://schemas.microsoft.com/office/drawing/2010/main" val="0"/>
+              </a:ext>
+            </a:extLst>
+          </a:blip>
+          <a:stretch>
+            <a:fillRect/>
+          </a:stretch>
+        </p:blipFill>
+        <p:spPr>
+          <a:xfrm>
+            <a:off x="5324221" y="1759463"/>
+            <a:ext cx="1080000" cy="1080000"/>
+          </a:xfrm>
+          <a:prstGeom prst="rect">
+            <a:avLst/>
+          </a:prstGeom>
+        </p:spPr>
+      </p:pic>
+      <p:pic>
+        <p:nvPicPr>
+          <p:cNvPr id="11" name="Picture 10"/>
+          <p:cNvPicPr>
+            <a:picLocks noChangeAspect="1"/>
+          </p:cNvPicPr>
+          <p:nvPr/>
+        </p:nvPicPr>
+        <p:blipFill>
+          <a:blip r:embed="rId5">
+            <a:extLst>
+              <a:ext uri="{28A0092B-C50C-407E-A947-70E740481C1C}">
+                <a14:useLocalDpi xmlns:a14="http://schemas.microsoft.com/office/drawing/2010/main" val="0"/>
+              </a:ext>
+            </a:extLst>
+          </a:blip>
+          <a:stretch>
+            <a:fillRect/>
+          </a:stretch>
+        </p:blipFill>
+        <p:spPr>
+          <a:xfrm>
+            <a:off x="2502151" y="1759463"/>
+            <a:ext cx="1080000" cy="1080000"/>
+          </a:xfrm>
+          <a:prstGeom prst="rect">
+            <a:avLst/>
+          </a:prstGeom>
+        </p:spPr>
+      </p:pic>
+      <p:sp>
+        <p:nvSpPr>
+          <p:cNvPr id="12" name="TextBox 11"/>
+          <p:cNvSpPr txBox="1"/>
+          <p:nvPr/>
+        </p:nvSpPr>
+        <p:spPr>
+          <a:xfrm>
+            <a:off x="2477002" y="2839463"/>
+            <a:ext cx="1130298" cy="369332"/>
+          </a:xfrm>
+          <a:prstGeom prst="rect">
+            <a:avLst/>
+          </a:prstGeom>
+          <a:noFill/>
+        </p:spPr>
+        <p:txBody>
+          <a:bodyPr wrap="square" rtlCol="0">
+            <a:spAutoFit/>
+          </a:bodyPr>
+          <a:lstStyle/>
+          <a:p>
+            <a:pPr algn="ctr"/>
+            <a:r>
+              <a:rPr lang="en-US" dirty="0" smtClean="0">
+                <a:solidFill>
+                  <a:schemeClr val="bg1"/>
+                </a:solidFill>
+              </a:rPr>
+              <a:t>Web Page</a:t>
+            </a:r>
+            <a:endParaRPr lang="en-US" dirty="0">
+              <a:solidFill>
+                <a:schemeClr val="bg1"/>
+              </a:solidFill>
+            </a:endParaRPr>
+          </a:p>
+        </p:txBody>
+      </p:sp>
+      <p:sp>
+        <p:nvSpPr>
+          <p:cNvPr id="13" name="TextBox 12"/>
+          <p:cNvSpPr txBox="1"/>
+          <p:nvPr/>
+        </p:nvSpPr>
+        <p:spPr>
+          <a:xfrm>
+            <a:off x="5040558" y="2839463"/>
+            <a:ext cx="1597028" cy="369332"/>
+          </a:xfrm>
+          <a:prstGeom prst="rect">
+            <a:avLst/>
+          </a:prstGeom>
+          <a:noFill/>
+        </p:spPr>
+        <p:txBody>
+          <a:bodyPr wrap="square" rtlCol="0">
+            <a:spAutoFit/>
+          </a:bodyPr>
+          <a:lstStyle/>
+          <a:p>
+            <a:pPr algn="ctr"/>
+            <a:r>
+              <a:rPr lang="en-US" dirty="0" smtClean="0">
+                <a:solidFill>
+                  <a:schemeClr val="bg1"/>
+                </a:solidFill>
+              </a:rPr>
+              <a:t>Service Worker</a:t>
+            </a:r>
+            <a:endParaRPr lang="en-US" dirty="0">
+              <a:solidFill>
+                <a:schemeClr val="bg1"/>
+              </a:solidFill>
+            </a:endParaRPr>
+          </a:p>
+        </p:txBody>
+      </p:sp>
+      <p:pic>
+        <p:nvPicPr>
+          <p:cNvPr id="15" name="Picture 14"/>
+          <p:cNvPicPr>
+            <a:picLocks noChangeAspect="1"/>
+          </p:cNvPicPr>
+          <p:nvPr/>
+        </p:nvPicPr>
+        <p:blipFill>
+          <a:blip r:embed="rId6">
+            <a:extLst>
+              <a:ext uri="{28A0092B-C50C-407E-A947-70E740481C1C}">
+                <a14:useLocalDpi xmlns:a14="http://schemas.microsoft.com/office/drawing/2010/main" val="0"/>
+              </a:ext>
+            </a:extLst>
+          </a:blip>
+          <a:stretch>
+            <a:fillRect/>
+          </a:stretch>
+        </p:blipFill>
+        <p:spPr>
+          <a:xfrm>
+            <a:off x="8674100" y="1759463"/>
+            <a:ext cx="1080000" cy="1080000"/>
+          </a:xfrm>
+          <a:prstGeom prst="rect">
+            <a:avLst/>
+          </a:prstGeom>
+        </p:spPr>
+      </p:pic>
+      <p:sp>
+        <p:nvSpPr>
+          <p:cNvPr id="17" name="TextBox 16"/>
+          <p:cNvSpPr txBox="1"/>
+          <p:nvPr/>
+        </p:nvSpPr>
+        <p:spPr>
+          <a:xfrm>
+            <a:off x="5273923" y="5454651"/>
+            <a:ext cx="1130298" cy="369332"/>
+          </a:xfrm>
+          <a:prstGeom prst="rect">
+            <a:avLst/>
+          </a:prstGeom>
+          <a:noFill/>
+        </p:spPr>
+        <p:txBody>
+          <a:bodyPr wrap="square" rtlCol="0">
+            <a:spAutoFit/>
+          </a:bodyPr>
+          <a:lstStyle/>
+          <a:p>
+            <a:pPr algn="ctr"/>
+            <a:r>
+              <a:rPr lang="en-US" dirty="0" smtClean="0">
+                <a:solidFill>
+                  <a:schemeClr val="bg1"/>
+                </a:solidFill>
+              </a:rPr>
+              <a:t>Cache</a:t>
+            </a:r>
+            <a:endParaRPr lang="en-US" dirty="0">
+              <a:solidFill>
+                <a:schemeClr val="bg1"/>
+              </a:solidFill>
+            </a:endParaRPr>
+          </a:p>
+        </p:txBody>
+      </p:sp>
+      <p:sp>
+        <p:nvSpPr>
+          <p:cNvPr id="18" name="TextBox 17"/>
+          <p:cNvSpPr txBox="1"/>
+          <p:nvPr/>
+        </p:nvSpPr>
+        <p:spPr>
+          <a:xfrm>
+            <a:off x="8415586" y="2834126"/>
+            <a:ext cx="1597028" cy="369332"/>
+          </a:xfrm>
+          <a:prstGeom prst="rect">
+            <a:avLst/>
+          </a:prstGeom>
+          <a:noFill/>
+        </p:spPr>
+        <p:txBody>
+          <a:bodyPr wrap="square" rtlCol="0">
+            <a:spAutoFit/>
+          </a:bodyPr>
+          <a:lstStyle/>
+          <a:p>
+            <a:pPr algn="ctr"/>
+            <a:r>
+              <a:rPr lang="en-US" dirty="0" smtClean="0">
+                <a:solidFill>
+                  <a:schemeClr val="bg1"/>
+                </a:solidFill>
+              </a:rPr>
+              <a:t>Network</a:t>
+            </a:r>
+          </a:p>
+        </p:txBody>
+      </p:sp>
+      <p:cxnSp>
+        <p:nvCxnSpPr>
+          <p:cNvPr id="20" name="Straight Arrow Connector 19"/>
+          <p:cNvCxnSpPr/>
+          <p:nvPr/>
+        </p:nvCxnSpPr>
+        <p:spPr>
+          <a:xfrm>
+            <a:off x="3746500" y="2299463"/>
+            <a:ext cx="1294058" cy="0"/>
+          </a:xfrm>
+          <a:prstGeom prst="straightConnector1">
+            <a:avLst/>
+          </a:prstGeom>
+          <a:ln w="38100">
+            <a:solidFill>
+              <a:schemeClr val="bg1"/>
+            </a:solidFill>
+            <a:headEnd type="triangle" w="med" len="med"/>
+            <a:tailEnd type="triangle" w="med" len="med"/>
+          </a:ln>
+        </p:spPr>
+        <p:style>
+          <a:lnRef idx="1">
+            <a:schemeClr val="accent1"/>
+          </a:lnRef>
+          <a:fillRef idx="0">
+            <a:schemeClr val="accent1"/>
+          </a:fillRef>
+          <a:effectRef idx="0">
+            <a:schemeClr val="accent1"/>
+          </a:effectRef>
+          <a:fontRef idx="minor">
+            <a:schemeClr val="tx1"/>
+          </a:fontRef>
+        </p:style>
+      </p:cxnSp>
+      <p:cxnSp>
+        <p:nvCxnSpPr>
+          <p:cNvPr id="23" name="Straight Arrow Connector 22"/>
+          <p:cNvCxnSpPr/>
+          <p:nvPr/>
+        </p:nvCxnSpPr>
+        <p:spPr>
+          <a:xfrm flipV="1">
+            <a:off x="6637586" y="2299463"/>
+            <a:ext cx="1778000" cy="13463"/>
+          </a:xfrm>
+          <a:prstGeom prst="straightConnector1">
+            <a:avLst/>
+          </a:prstGeom>
+          <a:ln w="38100">
+            <a:solidFill>
+              <a:schemeClr val="bg1"/>
+            </a:solidFill>
+            <a:headEnd type="triangle" w="med" len="med"/>
+            <a:tailEnd type="triangle" w="med" len="med"/>
+          </a:ln>
+        </p:spPr>
+        <p:style>
+          <a:lnRef idx="1">
+            <a:schemeClr val="accent1"/>
+          </a:lnRef>
+          <a:fillRef idx="0">
+            <a:schemeClr val="accent1"/>
+          </a:fillRef>
+          <a:effectRef idx="0">
+            <a:schemeClr val="accent1"/>
+          </a:effectRef>
+          <a:fontRef idx="minor">
+            <a:schemeClr val="tx1"/>
+          </a:fontRef>
+        </p:style>
+      </p:cxnSp>
+      <p:cxnSp>
+        <p:nvCxnSpPr>
+          <p:cNvPr id="28" name="Straight Arrow Connector 27"/>
+          <p:cNvCxnSpPr/>
+          <p:nvPr/>
+        </p:nvCxnSpPr>
+        <p:spPr>
+          <a:xfrm>
+            <a:off x="5839072" y="3340100"/>
+            <a:ext cx="0" cy="800100"/>
+          </a:xfrm>
+          <a:prstGeom prst="straightConnector1">
+            <a:avLst/>
+          </a:prstGeom>
+          <a:ln w="38100">
+            <a:solidFill>
+              <a:schemeClr val="bg1"/>
+            </a:solidFill>
+            <a:headEnd type="triangle" w="med" len="med"/>
+            <a:tailEnd type="triangle" w="med" len="med"/>
+          </a:ln>
+        </p:spPr>
+        <p:style>
+          <a:lnRef idx="1">
+            <a:schemeClr val="accent1"/>
+          </a:lnRef>
+          <a:fillRef idx="0">
+            <a:schemeClr val="accent1"/>
+          </a:fillRef>
+          <a:effectRef idx="0">
+            <a:schemeClr val="accent1"/>
+          </a:effectRef>
+          <a:fontRef idx="minor">
+            <a:schemeClr val="tx1"/>
+          </a:fontRef>
+        </p:style>
+      </p:cxnSp>
+    </p:spTree>
+    <p:extLst>
+      <p:ext uri="{BB962C8B-B14F-4D97-AF65-F5344CB8AC3E}">
+        <p14:creationId xmlns:p14="http://schemas.microsoft.com/office/powerpoint/2010/main" val="1068685308"/>
+      </p:ext>
+    </p:extLst>
+  </p:cSld>
+  <p:clrMapOvr>
+    <a:masterClrMapping/>
+  </p:clrMapOvr>
+</p:sld>
+</file>
+
+<file path=ppt/slides/slide4.xml><?xml version="1.0" encoding="utf-8"?>
+<p:sld xmlns:a="http://schemas.openxmlformats.org/drawingml/2006/main" xmlns:r="http://schemas.openxmlformats.org/officeDocument/2006/relationships" xmlns:p="http://schemas.openxmlformats.org/presentationml/2006/main">
+  <p:cSld>
+    <p:bg>
+      <p:bgPr>
+        <a:solidFill>
+          <a:schemeClr val="accent5"/>
+        </a:solidFill>
+        <a:effectLst/>
+      </p:bgPr>
+    </p:bg>
+    <p:spTree>
+      <p:nvGrpSpPr>
+        <p:cNvPr id="1" name=""/>
+        <p:cNvGrpSpPr/>
+        <p:nvPr/>
+      </p:nvGrpSpPr>
+      <p:grpSpPr>
+        <a:xfrm>
+          <a:off x="0" y="0"/>
+          <a:ext cx="0" cy="0"/>
+          <a:chOff x="0" y="0"/>
+          <a:chExt cx="0" cy="0"/>
+        </a:xfrm>
+      </p:grpSpPr>
+      <p:pic>
+        <p:nvPicPr>
+          <p:cNvPr id="8" name="Picture 7"/>
+          <p:cNvPicPr>
+            <a:picLocks noChangeAspect="1"/>
+          </p:cNvPicPr>
+          <p:nvPr/>
+        </p:nvPicPr>
+        <p:blipFill>
+          <a:blip r:embed="rId3">
+            <a:extLst>
+              <a:ext uri="{28A0092B-C50C-407E-A947-70E740481C1C}">
+                <a14:useLocalDpi xmlns:a14="http://schemas.microsoft.com/office/drawing/2010/main" val="0"/>
+              </a:ext>
+            </a:extLst>
+          </a:blip>
+          <a:stretch>
+            <a:fillRect/>
+          </a:stretch>
+        </p:blipFill>
+        <p:spPr>
+          <a:xfrm>
+            <a:off x="5299072" y="4324352"/>
+            <a:ext cx="1080000" cy="1080000"/>
+          </a:xfrm>
+          <a:prstGeom prst="rect">
+            <a:avLst/>
+          </a:prstGeom>
+        </p:spPr>
+      </p:pic>
+      <p:pic>
+        <p:nvPicPr>
+          <p:cNvPr id="10" name="Picture 9"/>
+          <p:cNvPicPr>
+            <a:picLocks noChangeAspect="1"/>
+          </p:cNvPicPr>
+          <p:nvPr/>
+        </p:nvPicPr>
+        <p:blipFill>
+          <a:blip r:embed="rId4">
+            <a:extLst>
+              <a:ext uri="{28A0092B-C50C-407E-A947-70E740481C1C}">
+                <a14:useLocalDpi xmlns:a14="http://schemas.microsoft.com/office/drawing/2010/main" val="0"/>
+              </a:ext>
+            </a:extLst>
+          </a:blip>
+          <a:stretch>
+            <a:fillRect/>
+          </a:stretch>
+        </p:blipFill>
+        <p:spPr>
+          <a:xfrm>
+            <a:off x="5324221" y="1759463"/>
+            <a:ext cx="1080000" cy="1080000"/>
+          </a:xfrm>
+          <a:prstGeom prst="rect">
+            <a:avLst/>
+          </a:prstGeom>
+        </p:spPr>
+      </p:pic>
+      <p:pic>
+        <p:nvPicPr>
+          <p:cNvPr id="11" name="Picture 10"/>
+          <p:cNvPicPr>
+            <a:picLocks noChangeAspect="1"/>
+          </p:cNvPicPr>
+          <p:nvPr/>
+        </p:nvPicPr>
+        <p:blipFill>
+          <a:blip r:embed="rId5">
+            <a:extLst>
+              <a:ext uri="{28A0092B-C50C-407E-A947-70E740481C1C}">
+                <a14:useLocalDpi xmlns:a14="http://schemas.microsoft.com/office/drawing/2010/main" val="0"/>
+              </a:ext>
+            </a:extLst>
+          </a:blip>
+          <a:stretch>
+            <a:fillRect/>
+          </a:stretch>
+        </p:blipFill>
+        <p:spPr>
+          <a:xfrm>
+            <a:off x="2502151" y="1759463"/>
+            <a:ext cx="1080000" cy="1080000"/>
+          </a:xfrm>
+          <a:prstGeom prst="rect">
+            <a:avLst/>
+          </a:prstGeom>
+        </p:spPr>
+      </p:pic>
+      <p:sp>
+        <p:nvSpPr>
+          <p:cNvPr id="12" name="TextBox 11"/>
+          <p:cNvSpPr txBox="1"/>
+          <p:nvPr/>
+        </p:nvSpPr>
+        <p:spPr>
+          <a:xfrm>
+            <a:off x="2477002" y="2839463"/>
+            <a:ext cx="1130298" cy="369332"/>
+          </a:xfrm>
+          <a:prstGeom prst="rect">
+            <a:avLst/>
+          </a:prstGeom>
+          <a:noFill/>
+        </p:spPr>
+        <p:txBody>
+          <a:bodyPr wrap="square" rtlCol="0">
+            <a:spAutoFit/>
+          </a:bodyPr>
+          <a:lstStyle/>
+          <a:p>
+            <a:pPr algn="ctr"/>
+            <a:r>
+              <a:rPr lang="en-US" dirty="0" smtClean="0">
+                <a:solidFill>
+                  <a:schemeClr val="bg1"/>
+                </a:solidFill>
+              </a:rPr>
+              <a:t>Web Page</a:t>
+            </a:r>
+            <a:endParaRPr lang="en-US" dirty="0">
+              <a:solidFill>
+                <a:schemeClr val="bg1"/>
+              </a:solidFill>
+            </a:endParaRPr>
+          </a:p>
+        </p:txBody>
+      </p:sp>
+      <p:sp>
+        <p:nvSpPr>
+          <p:cNvPr id="13" name="TextBox 12"/>
+          <p:cNvSpPr txBox="1"/>
+          <p:nvPr/>
+        </p:nvSpPr>
+        <p:spPr>
+          <a:xfrm>
+            <a:off x="5040558" y="2839463"/>
+            <a:ext cx="1597028" cy="369332"/>
+          </a:xfrm>
+          <a:prstGeom prst="rect">
+            <a:avLst/>
+          </a:prstGeom>
+          <a:noFill/>
+        </p:spPr>
+        <p:txBody>
+          <a:bodyPr wrap="square" rtlCol="0">
+            <a:spAutoFit/>
+          </a:bodyPr>
+          <a:lstStyle/>
+          <a:p>
+            <a:pPr algn="ctr"/>
+            <a:r>
+              <a:rPr lang="en-US" dirty="0" smtClean="0">
+                <a:solidFill>
+                  <a:schemeClr val="bg1"/>
+                </a:solidFill>
+              </a:rPr>
+              <a:t>Service Worker</a:t>
+            </a:r>
+            <a:endParaRPr lang="en-US" dirty="0">
+              <a:solidFill>
+                <a:schemeClr val="bg1"/>
+              </a:solidFill>
+            </a:endParaRPr>
+          </a:p>
+        </p:txBody>
+      </p:sp>
+      <p:pic>
+        <p:nvPicPr>
+          <p:cNvPr id="15" name="Picture 14"/>
+          <p:cNvPicPr>
+            <a:picLocks noChangeAspect="1"/>
+          </p:cNvPicPr>
+          <p:nvPr/>
+        </p:nvPicPr>
+        <p:blipFill>
+          <a:blip r:embed="rId6">
+            <a:extLst>
+              <a:ext uri="{28A0092B-C50C-407E-A947-70E740481C1C}">
+                <a14:useLocalDpi xmlns:a14="http://schemas.microsoft.com/office/drawing/2010/main" val="0"/>
+              </a:ext>
+            </a:extLst>
+          </a:blip>
+          <a:stretch>
+            <a:fillRect/>
+          </a:stretch>
+        </p:blipFill>
+        <p:spPr>
+          <a:xfrm>
+            <a:off x="8674100" y="1759463"/>
+            <a:ext cx="1080000" cy="1080000"/>
+          </a:xfrm>
+          <a:prstGeom prst="rect">
+            <a:avLst/>
+          </a:prstGeom>
+        </p:spPr>
+      </p:pic>
+      <p:sp>
+        <p:nvSpPr>
+          <p:cNvPr id="17" name="TextBox 16"/>
+          <p:cNvSpPr txBox="1"/>
+          <p:nvPr/>
+        </p:nvSpPr>
+        <p:spPr>
+          <a:xfrm>
+            <a:off x="5273923" y="5454651"/>
+            <a:ext cx="1130298" cy="369332"/>
+          </a:xfrm>
+          <a:prstGeom prst="rect">
+            <a:avLst/>
+          </a:prstGeom>
+          <a:noFill/>
+        </p:spPr>
+        <p:txBody>
+          <a:bodyPr wrap="square" rtlCol="0">
+            <a:spAutoFit/>
+          </a:bodyPr>
+          <a:lstStyle/>
+          <a:p>
+            <a:pPr algn="ctr"/>
+            <a:r>
+              <a:rPr lang="en-US" dirty="0" smtClean="0">
+                <a:solidFill>
+                  <a:schemeClr val="bg1"/>
+                </a:solidFill>
+              </a:rPr>
+              <a:t>Cache</a:t>
+            </a:r>
+            <a:endParaRPr lang="en-US" dirty="0">
+              <a:solidFill>
+                <a:schemeClr val="bg1"/>
+              </a:solidFill>
+            </a:endParaRPr>
+          </a:p>
+        </p:txBody>
+      </p:sp>
+      <p:sp>
+        <p:nvSpPr>
+          <p:cNvPr id="18" name="TextBox 17"/>
+          <p:cNvSpPr txBox="1"/>
+          <p:nvPr/>
+        </p:nvSpPr>
+        <p:spPr>
+          <a:xfrm>
+            <a:off x="8415586" y="2834126"/>
+            <a:ext cx="1597028" cy="369332"/>
+          </a:xfrm>
+          <a:prstGeom prst="rect">
+            <a:avLst/>
+          </a:prstGeom>
+          <a:noFill/>
+        </p:spPr>
+        <p:txBody>
+          <a:bodyPr wrap="square" rtlCol="0">
+            <a:spAutoFit/>
+          </a:bodyPr>
+          <a:lstStyle/>
+          <a:p>
+            <a:pPr algn="ctr"/>
+            <a:r>
+              <a:rPr lang="en-US" dirty="0" smtClean="0">
+                <a:solidFill>
+                  <a:schemeClr val="bg1"/>
+                </a:solidFill>
+              </a:rPr>
+              <a:t>Network</a:t>
+            </a:r>
+          </a:p>
+        </p:txBody>
+      </p:sp>
+      <p:cxnSp>
+        <p:nvCxnSpPr>
+          <p:cNvPr id="20" name="Straight Arrow Connector 19"/>
+          <p:cNvCxnSpPr/>
+          <p:nvPr/>
+        </p:nvCxnSpPr>
+        <p:spPr>
+          <a:xfrm>
+            <a:off x="3746500" y="2299463"/>
+            <a:ext cx="1294058" cy="0"/>
+          </a:xfrm>
+          <a:prstGeom prst="straightConnector1">
+            <a:avLst/>
+          </a:prstGeom>
+          <a:ln w="38100">
+            <a:solidFill>
+              <a:schemeClr val="bg1"/>
+            </a:solidFill>
+            <a:headEnd type="triangle" w="med" len="med"/>
+            <a:tailEnd type="triangle" w="med" len="med"/>
+          </a:ln>
+        </p:spPr>
+        <p:style>
+          <a:lnRef idx="1">
+            <a:schemeClr val="accent1"/>
+          </a:lnRef>
+          <a:fillRef idx="0">
+            <a:schemeClr val="accent1"/>
+          </a:fillRef>
+          <a:effectRef idx="0">
+            <a:schemeClr val="accent1"/>
+          </a:effectRef>
+          <a:fontRef idx="minor">
+            <a:schemeClr val="tx1"/>
+          </a:fontRef>
+        </p:style>
+      </p:cxnSp>
+      <p:cxnSp>
+        <p:nvCxnSpPr>
+          <p:cNvPr id="23" name="Straight Arrow Connector 22"/>
+          <p:cNvCxnSpPr/>
+          <p:nvPr/>
+        </p:nvCxnSpPr>
+        <p:spPr>
+          <a:xfrm flipV="1">
+            <a:off x="6637586" y="2299463"/>
+            <a:ext cx="1778000" cy="13463"/>
+          </a:xfrm>
+          <a:prstGeom prst="straightConnector1">
+            <a:avLst/>
+          </a:prstGeom>
+          <a:ln w="38100">
+            <a:solidFill>
+              <a:schemeClr val="bg1"/>
+            </a:solidFill>
+            <a:headEnd type="triangle" w="med" len="med"/>
+            <a:tailEnd type="triangle" w="med" len="med"/>
+          </a:ln>
+        </p:spPr>
+        <p:style>
+          <a:lnRef idx="1">
+            <a:schemeClr val="accent1"/>
+          </a:lnRef>
+          <a:fillRef idx="0">
+            <a:schemeClr val="accent1"/>
+          </a:fillRef>
+          <a:effectRef idx="0">
+            <a:schemeClr val="accent1"/>
+          </a:effectRef>
+          <a:fontRef idx="minor">
+            <a:schemeClr val="tx1"/>
+          </a:fontRef>
+        </p:style>
+      </p:cxnSp>
+      <p:cxnSp>
+        <p:nvCxnSpPr>
+          <p:cNvPr id="28" name="Straight Arrow Connector 27"/>
+          <p:cNvCxnSpPr/>
+          <p:nvPr/>
+        </p:nvCxnSpPr>
+        <p:spPr>
+          <a:xfrm>
+            <a:off x="5839072" y="3340100"/>
+            <a:ext cx="0" cy="800100"/>
+          </a:xfrm>
+          <a:prstGeom prst="straightConnector1">
+            <a:avLst/>
+          </a:prstGeom>
+          <a:ln w="38100">
+            <a:solidFill>
+              <a:schemeClr val="bg1"/>
+            </a:solidFill>
+            <a:headEnd type="triangle" w="med" len="med"/>
+            <a:tailEnd type="triangle" w="med" len="med"/>
+          </a:ln>
+        </p:spPr>
+        <p:style>
+          <a:lnRef idx="1">
+            <a:schemeClr val="accent1"/>
+          </a:lnRef>
+          <a:fillRef idx="0">
+            <a:schemeClr val="accent1"/>
+          </a:fillRef>
+          <a:effectRef idx="0">
+            <a:schemeClr val="accent1"/>
+          </a:effectRef>
+          <a:fontRef idx="minor">
+            <a:schemeClr val="tx1"/>
+          </a:fontRef>
+        </p:style>
+      </p:cxnSp>
+      <p:cxnSp>
+        <p:nvCxnSpPr>
+          <p:cNvPr id="3" name="Straight Connector 2"/>
+          <p:cNvCxnSpPr/>
+          <p:nvPr/>
+        </p:nvCxnSpPr>
+        <p:spPr>
+          <a:xfrm>
+            <a:off x="7366000" y="1168400"/>
+            <a:ext cx="0" cy="4800600"/>
+          </a:xfrm>
+          <a:prstGeom prst="line">
+            <a:avLst/>
+          </a:prstGeom>
+          <a:ln w="28575">
+            <a:solidFill>
+              <a:schemeClr val="bg1">
+                <a:lumMod val="75000"/>
+              </a:schemeClr>
+            </a:solidFill>
+            <a:prstDash val="dashDot"/>
+          </a:ln>
+        </p:spPr>
+        <p:style>
+          <a:lnRef idx="1">
+            <a:schemeClr val="accent1"/>
+          </a:lnRef>
+          <a:fillRef idx="0">
+            <a:schemeClr val="accent1"/>
+          </a:fillRef>
+          <a:effectRef idx="0">
+            <a:schemeClr val="accent1"/>
+          </a:effectRef>
+          <a:fontRef idx="minor">
+            <a:schemeClr val="tx1"/>
+          </a:fontRef>
+        </p:style>
+      </p:cxnSp>
+    </p:spTree>
+    <p:extLst>
+      <p:ext uri="{BB962C8B-B14F-4D97-AF65-F5344CB8AC3E}">
+        <p14:creationId xmlns:p14="http://schemas.microsoft.com/office/powerpoint/2010/main" val="359805446"/>
+      </p:ext>
+    </p:extLst>
+  </p:cSld>
+  <p:clrMapOvr>
+    <a:masterClrMapping/>
+  </p:clrMapOvr>
+</p:sld>
+</file>
+
+<file path=ppt/slides/slide5.xml><?xml version="1.0" encoding="utf-8"?>
+<p:sld xmlns:a="http://schemas.openxmlformats.org/drawingml/2006/main" xmlns:r="http://schemas.openxmlformats.org/officeDocument/2006/relationships" xmlns:p="http://schemas.openxmlformats.org/presentationml/2006/main">
+  <p:cSld>
+    <p:bg>
+      <p:bgPr>
+        <a:solidFill>
+          <a:schemeClr val="accent5"/>
+        </a:solidFill>
+        <a:effectLst/>
+      </p:bgPr>
+    </p:bg>
+    <p:spTree>
+      <p:nvGrpSpPr>
+        <p:cNvPr id="1" name=""/>
+        <p:cNvGrpSpPr/>
+        <p:nvPr/>
+      </p:nvGrpSpPr>
+      <p:grpSpPr>
+        <a:xfrm>
+          <a:off x="0" y="0"/>
+          <a:ext cx="0" cy="0"/>
+          <a:chOff x="0" y="0"/>
+          <a:chExt cx="0" cy="0"/>
+        </a:xfrm>
+      </p:grpSpPr>
+      <p:pic>
+        <p:nvPicPr>
+          <p:cNvPr id="8" name="Picture 7"/>
+          <p:cNvPicPr>
+            <a:picLocks noChangeAspect="1"/>
+          </p:cNvPicPr>
+          <p:nvPr/>
+        </p:nvPicPr>
+        <p:blipFill>
+          <a:blip r:embed="rId3">
+            <a:extLst>
+              <a:ext uri="{28A0092B-C50C-407E-A947-70E740481C1C}">
+                <a14:useLocalDpi xmlns:a14="http://schemas.microsoft.com/office/drawing/2010/main" val="0"/>
+              </a:ext>
+            </a:extLst>
+          </a:blip>
+          <a:stretch>
+            <a:fillRect/>
+          </a:stretch>
+        </p:blipFill>
+        <p:spPr>
+          <a:xfrm>
+            <a:off x="5299072" y="4324352"/>
+            <a:ext cx="1080000" cy="1080000"/>
+          </a:xfrm>
+          <a:prstGeom prst="rect">
+            <a:avLst/>
+          </a:prstGeom>
+        </p:spPr>
+      </p:pic>
+      <p:pic>
+        <p:nvPicPr>
+          <p:cNvPr id="10" name="Picture 9"/>
+          <p:cNvPicPr>
+            <a:picLocks noChangeAspect="1"/>
+          </p:cNvPicPr>
+          <p:nvPr/>
+        </p:nvPicPr>
+        <p:blipFill>
+          <a:blip r:embed="rId4">
+            <a:extLst>
+              <a:ext uri="{28A0092B-C50C-407E-A947-70E740481C1C}">
+                <a14:useLocalDpi xmlns:a14="http://schemas.microsoft.com/office/drawing/2010/main" val="0"/>
+              </a:ext>
+            </a:extLst>
+          </a:blip>
+          <a:stretch>
+            <a:fillRect/>
+          </a:stretch>
+        </p:blipFill>
+        <p:spPr>
+          <a:xfrm>
+            <a:off x="5324221" y="1759463"/>
+            <a:ext cx="1080000" cy="1080000"/>
+          </a:xfrm>
+          <a:prstGeom prst="rect">
+            <a:avLst/>
+          </a:prstGeom>
+        </p:spPr>
+      </p:pic>
+      <p:pic>
+        <p:nvPicPr>
+          <p:cNvPr id="11" name="Picture 10"/>
+          <p:cNvPicPr>
+            <a:picLocks noChangeAspect="1"/>
+          </p:cNvPicPr>
+          <p:nvPr/>
+        </p:nvPicPr>
+        <p:blipFill>
+          <a:blip r:embed="rId5">
+            <a:extLst>
+              <a:ext uri="{28A0092B-C50C-407E-A947-70E740481C1C}">
+                <a14:useLocalDpi xmlns:a14="http://schemas.microsoft.com/office/drawing/2010/main" val="0"/>
+              </a:ext>
+            </a:extLst>
+          </a:blip>
+          <a:stretch>
+            <a:fillRect/>
+          </a:stretch>
+        </p:blipFill>
+        <p:spPr>
+          <a:xfrm>
+            <a:off x="2502151" y="1759463"/>
+            <a:ext cx="1080000" cy="1080000"/>
+          </a:xfrm>
+          <a:prstGeom prst="rect">
+            <a:avLst/>
+          </a:prstGeom>
+        </p:spPr>
+      </p:pic>
+      <p:sp>
+        <p:nvSpPr>
+          <p:cNvPr id="12" name="TextBox 11"/>
+          <p:cNvSpPr txBox="1"/>
+          <p:nvPr/>
+        </p:nvSpPr>
+        <p:spPr>
+          <a:xfrm>
+            <a:off x="2323044" y="2860514"/>
+            <a:ext cx="1423456" cy="369332"/>
+          </a:xfrm>
+          <a:prstGeom prst="rect">
+            <a:avLst/>
+          </a:prstGeom>
+          <a:noFill/>
+        </p:spPr>
+        <p:txBody>
+          <a:bodyPr wrap="square" rtlCol="0">
+            <a:spAutoFit/>
+          </a:bodyPr>
+          <a:lstStyle/>
+          <a:p>
+            <a:pPr algn="ctr"/>
+            <a:r>
+              <a:rPr lang="en-US" dirty="0" smtClean="0">
+                <a:solidFill>
+                  <a:schemeClr val="bg1"/>
+                </a:solidFill>
+              </a:rPr>
+              <a:t>Web Page</a:t>
+            </a:r>
+            <a:endParaRPr lang="en-US" dirty="0">
+              <a:solidFill>
+                <a:schemeClr val="bg1"/>
+              </a:solidFill>
+            </a:endParaRPr>
+          </a:p>
+        </p:txBody>
+      </p:sp>
+      <p:sp>
+        <p:nvSpPr>
+          <p:cNvPr id="13" name="TextBox 12"/>
+          <p:cNvSpPr txBox="1"/>
+          <p:nvPr/>
+        </p:nvSpPr>
+        <p:spPr>
+          <a:xfrm>
+            <a:off x="4887463" y="2860514"/>
+            <a:ext cx="1903218" cy="369332"/>
+          </a:xfrm>
+          <a:prstGeom prst="rect">
+            <a:avLst/>
+          </a:prstGeom>
+          <a:noFill/>
+        </p:spPr>
+        <p:txBody>
+          <a:bodyPr wrap="square" rtlCol="0">
+            <a:spAutoFit/>
+          </a:bodyPr>
+          <a:lstStyle/>
+          <a:p>
+            <a:pPr algn="ctr"/>
+            <a:r>
+              <a:rPr lang="en-US" dirty="0" smtClean="0">
+                <a:solidFill>
+                  <a:schemeClr val="bg1"/>
+                </a:solidFill>
+              </a:rPr>
+              <a:t>Service Worker</a:t>
+            </a:r>
+            <a:endParaRPr lang="en-US" dirty="0">
+              <a:solidFill>
+                <a:schemeClr val="bg1"/>
+              </a:solidFill>
+            </a:endParaRPr>
+          </a:p>
+        </p:txBody>
+      </p:sp>
+      <p:pic>
+        <p:nvPicPr>
+          <p:cNvPr id="15" name="Picture 14"/>
+          <p:cNvPicPr>
+            <a:picLocks noChangeAspect="1"/>
+          </p:cNvPicPr>
+          <p:nvPr/>
+        </p:nvPicPr>
+        <p:blipFill>
+          <a:blip r:embed="rId6">
+            <a:extLst>
+              <a:ext uri="{28A0092B-C50C-407E-A947-70E740481C1C}">
+                <a14:useLocalDpi xmlns:a14="http://schemas.microsoft.com/office/drawing/2010/main" val="0"/>
+              </a:ext>
+            </a:extLst>
+          </a:blip>
+          <a:stretch>
+            <a:fillRect/>
+          </a:stretch>
+        </p:blipFill>
+        <p:spPr>
+          <a:xfrm>
+            <a:off x="8674100" y="1759463"/>
+            <a:ext cx="1080000" cy="1080000"/>
+          </a:xfrm>
+          <a:prstGeom prst="rect">
+            <a:avLst/>
+          </a:prstGeom>
+        </p:spPr>
+      </p:pic>
+      <p:sp>
+        <p:nvSpPr>
+          <p:cNvPr id="17" name="TextBox 16"/>
+          <p:cNvSpPr txBox="1"/>
+          <p:nvPr/>
+        </p:nvSpPr>
+        <p:spPr>
+          <a:xfrm>
+            <a:off x="5273923" y="5454651"/>
+            <a:ext cx="1130298" cy="369332"/>
+          </a:xfrm>
+          <a:prstGeom prst="rect">
+            <a:avLst/>
+          </a:prstGeom>
+          <a:noFill/>
+        </p:spPr>
+        <p:txBody>
+          <a:bodyPr wrap="square" rtlCol="0">
+            <a:spAutoFit/>
+          </a:bodyPr>
+          <a:lstStyle/>
+          <a:p>
+            <a:pPr algn="ctr"/>
+            <a:r>
+              <a:rPr lang="en-US" dirty="0" smtClean="0">
+                <a:solidFill>
+                  <a:schemeClr val="bg1"/>
+                </a:solidFill>
+              </a:rPr>
+              <a:t>Cache</a:t>
+            </a:r>
+            <a:endParaRPr lang="en-US" dirty="0">
+              <a:solidFill>
+                <a:schemeClr val="bg1"/>
+              </a:solidFill>
+            </a:endParaRPr>
+          </a:p>
+        </p:txBody>
+      </p:sp>
+      <p:sp>
+        <p:nvSpPr>
+          <p:cNvPr id="18" name="TextBox 17"/>
+          <p:cNvSpPr txBox="1"/>
+          <p:nvPr/>
+        </p:nvSpPr>
+        <p:spPr>
+          <a:xfrm>
+            <a:off x="8415586" y="2834126"/>
+            <a:ext cx="1597028" cy="369332"/>
+          </a:xfrm>
+          <a:prstGeom prst="rect">
+            <a:avLst/>
+          </a:prstGeom>
+          <a:noFill/>
+        </p:spPr>
+        <p:txBody>
+          <a:bodyPr wrap="square" rtlCol="0">
+            <a:spAutoFit/>
+          </a:bodyPr>
+          <a:lstStyle/>
+          <a:p>
+            <a:pPr algn="ctr"/>
+            <a:r>
+              <a:rPr lang="en-US" dirty="0" smtClean="0">
+                <a:solidFill>
+                  <a:schemeClr val="bg1"/>
+                </a:solidFill>
+              </a:rPr>
+              <a:t>Network</a:t>
+            </a:r>
+          </a:p>
+        </p:txBody>
+      </p:sp>
+      <p:cxnSp>
+        <p:nvCxnSpPr>
+          <p:cNvPr id="20" name="Straight Arrow Connector 19"/>
+          <p:cNvCxnSpPr/>
+          <p:nvPr/>
+        </p:nvCxnSpPr>
+        <p:spPr>
+          <a:xfrm>
+            <a:off x="3746500" y="2299463"/>
+            <a:ext cx="1294058" cy="0"/>
+          </a:xfrm>
+          <a:prstGeom prst="straightConnector1">
+            <a:avLst/>
+          </a:prstGeom>
+          <a:ln w="38100">
+            <a:solidFill>
+              <a:schemeClr val="bg1"/>
+            </a:solidFill>
+            <a:miter lim="800000"/>
+            <a:headEnd type="none" w="med" len="med"/>
+            <a:tailEnd type="triangle" w="med" len="med"/>
+          </a:ln>
+        </p:spPr>
+        <p:style>
+          <a:lnRef idx="1">
+            <a:schemeClr val="accent1"/>
+          </a:lnRef>
+          <a:fillRef idx="0">
+            <a:schemeClr val="accent1"/>
+          </a:fillRef>
+          <a:effectRef idx="0">
+            <a:schemeClr val="accent1"/>
+          </a:effectRef>
+          <a:fontRef idx="minor">
+            <a:schemeClr val="tx1"/>
+          </a:fontRef>
+        </p:style>
+      </p:cxnSp>
+      <p:cxnSp>
+        <p:nvCxnSpPr>
+          <p:cNvPr id="23" name="Straight Arrow Connector 22"/>
+          <p:cNvCxnSpPr/>
+          <p:nvPr/>
+        </p:nvCxnSpPr>
+        <p:spPr>
+          <a:xfrm flipV="1">
+            <a:off x="6637586" y="2299463"/>
+            <a:ext cx="1778000" cy="13463"/>
+          </a:xfrm>
+          <a:prstGeom prst="straightConnector1">
+            <a:avLst/>
+          </a:prstGeom>
+          <a:ln w="38100">
+            <a:solidFill>
+              <a:schemeClr val="bg1"/>
+            </a:solidFill>
+            <a:headEnd type="none" w="med" len="med"/>
+            <a:tailEnd type="triangle" w="med" len="med"/>
+          </a:ln>
+        </p:spPr>
+        <p:style>
+          <a:lnRef idx="1">
+            <a:schemeClr val="accent1"/>
+          </a:lnRef>
+          <a:fillRef idx="0">
+            <a:schemeClr val="accent1"/>
+          </a:fillRef>
+          <a:effectRef idx="0">
+            <a:schemeClr val="accent1"/>
+          </a:effectRef>
+          <a:fontRef idx="minor">
+            <a:schemeClr val="tx1"/>
+          </a:fontRef>
+        </p:style>
+      </p:cxnSp>
+      <p:cxnSp>
+        <p:nvCxnSpPr>
+          <p:cNvPr id="28" name="Straight Arrow Connector 27"/>
+          <p:cNvCxnSpPr/>
+          <p:nvPr/>
+        </p:nvCxnSpPr>
+        <p:spPr>
+          <a:xfrm>
+            <a:off x="5839072" y="3340100"/>
+            <a:ext cx="0" cy="800100"/>
+          </a:xfrm>
+          <a:prstGeom prst="straightConnector1">
+            <a:avLst/>
+          </a:prstGeom>
+          <a:ln w="38100">
+            <a:solidFill>
+              <a:schemeClr val="bg1"/>
+            </a:solidFill>
+            <a:headEnd type="none" w="med" len="med"/>
+            <a:tailEnd type="triangle" w="med" len="med"/>
+          </a:ln>
+        </p:spPr>
+        <p:style>
+          <a:lnRef idx="1">
+            <a:schemeClr val="accent1"/>
+          </a:lnRef>
+          <a:fillRef idx="0">
+            <a:schemeClr val="accent1"/>
+          </a:fillRef>
+          <a:effectRef idx="0">
+            <a:schemeClr val="accent1"/>
+          </a:effectRef>
+          <a:fontRef idx="minor">
+            <a:schemeClr val="tx1"/>
+          </a:fontRef>
+        </p:style>
+      </p:cxnSp>
+      <p:cxnSp>
+        <p:nvCxnSpPr>
+          <p:cNvPr id="3" name="Straight Connector 2"/>
+          <p:cNvCxnSpPr/>
+          <p:nvPr/>
+        </p:nvCxnSpPr>
+        <p:spPr>
+          <a:xfrm>
+            <a:off x="7366000" y="1168400"/>
+            <a:ext cx="0" cy="4800600"/>
+          </a:xfrm>
+          <a:prstGeom prst="line">
+            <a:avLst/>
+          </a:prstGeom>
+          <a:ln w="28575">
+            <a:solidFill>
+              <a:schemeClr val="bg1">
+                <a:lumMod val="75000"/>
+              </a:schemeClr>
+            </a:solidFill>
+            <a:prstDash val="dashDot"/>
+          </a:ln>
+        </p:spPr>
+        <p:style>
+          <a:lnRef idx="1">
+            <a:schemeClr val="accent1"/>
+          </a:lnRef>
+          <a:fillRef idx="0">
+            <a:schemeClr val="accent1"/>
+          </a:fillRef>
+          <a:effectRef idx="0">
+            <a:schemeClr val="accent1"/>
+          </a:effectRef>
+          <a:fontRef idx="minor">
+            <a:schemeClr val="tx1"/>
+          </a:fontRef>
+        </p:style>
+      </p:cxnSp>
+      <p:sp>
+        <p:nvSpPr>
+          <p:cNvPr id="2" name="TextBox 1"/>
+          <p:cNvSpPr txBox="1"/>
+          <p:nvPr/>
+        </p:nvSpPr>
+        <p:spPr>
+          <a:xfrm>
+            <a:off x="5610054" y="3732303"/>
+            <a:ext cx="466794" cy="707886"/>
+          </a:xfrm>
+          <a:prstGeom prst="rect">
+            <a:avLst/>
+          </a:prstGeom>
+          <a:noFill/>
+        </p:spPr>
+        <p:txBody>
+          <a:bodyPr wrap="none" rtlCol="0">
+            <a:spAutoFit/>
+          </a:bodyPr>
+          <a:lstStyle/>
+          <a:p>
+            <a:r>
+              <a:rPr lang="en-US" sz="4000" b="1" dirty="0" smtClean="0">
+                <a:solidFill>
+                  <a:srgbClr val="FF0000"/>
+                </a:solidFill>
+              </a:rPr>
+              <a:t>X</a:t>
+            </a:r>
+            <a:endParaRPr lang="en-US" sz="2800" b="1" dirty="0">
+              <a:solidFill>
+                <a:srgbClr val="FF0000"/>
+              </a:solidFill>
+            </a:endParaRPr>
+          </a:p>
+        </p:txBody>
+      </p:sp>
+      <p:sp>
+        <p:nvSpPr>
+          <p:cNvPr id="4" name="TextBox 3"/>
+          <p:cNvSpPr txBox="1"/>
+          <p:nvPr/>
+        </p:nvSpPr>
+        <p:spPr>
+          <a:xfrm>
+            <a:off x="4279884" y="1943594"/>
+            <a:ext cx="301686" cy="369332"/>
+          </a:xfrm>
+          <a:prstGeom prst="rect">
+            <a:avLst/>
+          </a:prstGeom>
+          <a:noFill/>
+        </p:spPr>
+        <p:txBody>
+          <a:bodyPr wrap="none" rtlCol="0">
+            <a:spAutoFit/>
+          </a:bodyPr>
+          <a:lstStyle/>
+          <a:p>
+            <a:r>
+              <a:rPr lang="en-US" dirty="0" smtClean="0">
+                <a:solidFill>
+                  <a:schemeClr val="bg1"/>
+                </a:solidFill>
+              </a:rPr>
+              <a:t>1</a:t>
+            </a:r>
+            <a:endParaRPr lang="en-US" dirty="0">
+              <a:solidFill>
+                <a:schemeClr val="bg1"/>
+              </a:solidFill>
+            </a:endParaRPr>
+          </a:p>
+        </p:txBody>
+      </p:sp>
+      <p:sp>
+        <p:nvSpPr>
+          <p:cNvPr id="16" name="TextBox 15"/>
+          <p:cNvSpPr txBox="1"/>
+          <p:nvPr/>
+        </p:nvSpPr>
+        <p:spPr>
+          <a:xfrm>
+            <a:off x="5473580" y="3547637"/>
+            <a:ext cx="301686" cy="369332"/>
+          </a:xfrm>
+          <a:prstGeom prst="rect">
+            <a:avLst/>
+          </a:prstGeom>
+          <a:noFill/>
+        </p:spPr>
+        <p:txBody>
+          <a:bodyPr wrap="none" rtlCol="0">
+            <a:spAutoFit/>
+          </a:bodyPr>
+          <a:lstStyle/>
+          <a:p>
+            <a:r>
+              <a:rPr lang="en-US" dirty="0" smtClean="0">
+                <a:solidFill>
+                  <a:schemeClr val="bg1"/>
+                </a:solidFill>
+              </a:rPr>
+              <a:t>2</a:t>
+            </a:r>
+            <a:endParaRPr lang="en-US" dirty="0">
+              <a:solidFill>
+                <a:schemeClr val="bg1"/>
+              </a:solidFill>
+            </a:endParaRPr>
+          </a:p>
+        </p:txBody>
+      </p:sp>
+      <p:sp>
+        <p:nvSpPr>
+          <p:cNvPr id="19" name="TextBox 18"/>
+          <p:cNvSpPr txBox="1"/>
+          <p:nvPr/>
+        </p:nvSpPr>
+        <p:spPr>
+          <a:xfrm>
+            <a:off x="7396202" y="1944088"/>
+            <a:ext cx="301686" cy="369332"/>
+          </a:xfrm>
+          <a:prstGeom prst="rect">
+            <a:avLst/>
+          </a:prstGeom>
+          <a:noFill/>
+        </p:spPr>
+        <p:txBody>
+          <a:bodyPr wrap="none" rtlCol="0">
+            <a:spAutoFit/>
+          </a:bodyPr>
+          <a:lstStyle/>
+          <a:p>
+            <a:r>
+              <a:rPr lang="en-US" dirty="0" smtClean="0">
+                <a:solidFill>
+                  <a:schemeClr val="bg1"/>
+                </a:solidFill>
+              </a:rPr>
+              <a:t>3</a:t>
+            </a:r>
+            <a:endParaRPr lang="en-US" dirty="0">
+              <a:solidFill>
+                <a:schemeClr val="bg1"/>
+              </a:solidFill>
+            </a:endParaRPr>
+          </a:p>
+        </p:txBody>
+      </p:sp>
+      <p:cxnSp>
+        <p:nvCxnSpPr>
+          <p:cNvPr id="6" name="Curved Connector 5"/>
+          <p:cNvCxnSpPr>
+            <a:stCxn id="15" idx="0"/>
+            <a:endCxn id="11" idx="0"/>
+          </p:cNvCxnSpPr>
+          <p:nvPr/>
+        </p:nvCxnSpPr>
+        <p:spPr>
+          <a:xfrm rot="16200000" flipV="1">
+            <a:off x="6128126" y="-1326512"/>
+            <a:ext cx="12700" cy="6171949"/>
+          </a:xfrm>
+          <a:prstGeom prst="curvedConnector3">
+            <a:avLst>
+              <a:gd name="adj1" fmla="val 3999984"/>
+            </a:avLst>
+          </a:prstGeom>
+          <a:ln w="38100">
+            <a:solidFill>
+              <a:schemeClr val="bg1"/>
+            </a:solidFill>
+            <a:tailEnd type="triangle"/>
+          </a:ln>
+        </p:spPr>
+        <p:style>
+          <a:lnRef idx="1">
+            <a:schemeClr val="accent1"/>
+          </a:lnRef>
+          <a:fillRef idx="0">
+            <a:schemeClr val="accent1"/>
+          </a:fillRef>
+          <a:effectRef idx="0">
+            <a:schemeClr val="accent1"/>
+          </a:effectRef>
+          <a:fontRef idx="minor">
+            <a:schemeClr val="tx1"/>
+          </a:fontRef>
+        </p:style>
+      </p:cxnSp>
+      <p:sp>
+        <p:nvSpPr>
+          <p:cNvPr id="21" name="TextBox 20"/>
+          <p:cNvSpPr txBox="1"/>
+          <p:nvPr/>
+        </p:nvSpPr>
+        <p:spPr>
+          <a:xfrm>
+            <a:off x="6057901" y="895333"/>
+            <a:ext cx="301686" cy="369332"/>
+          </a:xfrm>
+          <a:prstGeom prst="rect">
+            <a:avLst/>
+          </a:prstGeom>
+          <a:noFill/>
+        </p:spPr>
+        <p:txBody>
+          <a:bodyPr wrap="none" rtlCol="0">
+            <a:spAutoFit/>
+          </a:bodyPr>
+          <a:lstStyle/>
+          <a:p>
+            <a:r>
+              <a:rPr lang="en-US" dirty="0">
+                <a:solidFill>
+                  <a:schemeClr val="bg1"/>
+                </a:solidFill>
+              </a:rPr>
+              <a:t>4</a:t>
+            </a:r>
+          </a:p>
+        </p:txBody>
+      </p:sp>
+    </p:spTree>
+    <p:extLst>
+      <p:ext uri="{BB962C8B-B14F-4D97-AF65-F5344CB8AC3E}">
+        <p14:creationId xmlns:p14="http://schemas.microsoft.com/office/powerpoint/2010/main" val="589861163"/>
+      </p:ext>
+    </p:extLst>
+  </p:cSld>
+  <p:clrMapOvr>
+    <a:masterClrMapping/>
+  </p:clrMapOvr>
+</p:sld>
+</file>
+
+<file path=ppt/slides/slide6.xml><?xml version="1.0" encoding="utf-8"?>
+<p:sld xmlns:a="http://schemas.openxmlformats.org/drawingml/2006/main" xmlns:r="http://schemas.openxmlformats.org/officeDocument/2006/relationships" xmlns:p="http://schemas.openxmlformats.org/presentationml/2006/main">
+  <p:cSld>
+    <p:bg>
+      <p:bgPr>
+        <a:solidFill>
+          <a:schemeClr val="accent5"/>
+        </a:solidFill>
+        <a:effectLst/>
+      </p:bgPr>
+    </p:bg>
+    <p:spTree>
+      <p:nvGrpSpPr>
+        <p:cNvPr id="1" name=""/>
+        <p:cNvGrpSpPr/>
+        <p:nvPr/>
+      </p:nvGrpSpPr>
+      <p:grpSpPr>
+        <a:xfrm>
+          <a:off x="0" y="0"/>
+          <a:ext cx="0" cy="0"/>
+          <a:chOff x="0" y="0"/>
+          <a:chExt cx="0" cy="0"/>
+        </a:xfrm>
+      </p:grpSpPr>
+      <p:pic>
+        <p:nvPicPr>
+          <p:cNvPr id="8" name="Picture 7"/>
+          <p:cNvPicPr>
+            <a:picLocks noChangeAspect="1"/>
+          </p:cNvPicPr>
+          <p:nvPr/>
+        </p:nvPicPr>
+        <p:blipFill>
+          <a:blip r:embed="rId3">
+            <a:extLst>
+              <a:ext uri="{28A0092B-C50C-407E-A947-70E740481C1C}">
+                <a14:useLocalDpi xmlns:a14="http://schemas.microsoft.com/office/drawing/2010/main" val="0"/>
+              </a:ext>
+            </a:extLst>
+          </a:blip>
+          <a:stretch>
+            <a:fillRect/>
+          </a:stretch>
+        </p:blipFill>
+        <p:spPr>
+          <a:xfrm>
+            <a:off x="5299072" y="4324352"/>
+            <a:ext cx="1080000" cy="1080000"/>
+          </a:xfrm>
+          <a:prstGeom prst="rect">
+            <a:avLst/>
+          </a:prstGeom>
+        </p:spPr>
+      </p:pic>
+      <p:pic>
+        <p:nvPicPr>
+          <p:cNvPr id="10" name="Picture 9"/>
+          <p:cNvPicPr>
+            <a:picLocks noChangeAspect="1"/>
+          </p:cNvPicPr>
+          <p:nvPr/>
+        </p:nvPicPr>
+        <p:blipFill>
+          <a:blip r:embed="rId4">
+            <a:extLst>
+              <a:ext uri="{28A0092B-C50C-407E-A947-70E740481C1C}">
+                <a14:useLocalDpi xmlns:a14="http://schemas.microsoft.com/office/drawing/2010/main" val="0"/>
+              </a:ext>
+            </a:extLst>
+          </a:blip>
+          <a:stretch>
+            <a:fillRect/>
+          </a:stretch>
+        </p:blipFill>
+        <p:spPr>
+          <a:xfrm>
+            <a:off x="5324221" y="1759463"/>
+            <a:ext cx="1080000" cy="1080000"/>
+          </a:xfrm>
+          <a:prstGeom prst="rect">
+            <a:avLst/>
+          </a:prstGeom>
+        </p:spPr>
+      </p:pic>
+      <p:pic>
+        <p:nvPicPr>
+          <p:cNvPr id="11" name="Picture 10"/>
+          <p:cNvPicPr>
+            <a:picLocks noChangeAspect="1"/>
+          </p:cNvPicPr>
+          <p:nvPr/>
+        </p:nvPicPr>
+        <p:blipFill>
+          <a:blip r:embed="rId5">
+            <a:extLst>
+              <a:ext uri="{28A0092B-C50C-407E-A947-70E740481C1C}">
+                <a14:useLocalDpi xmlns:a14="http://schemas.microsoft.com/office/drawing/2010/main" val="0"/>
+              </a:ext>
+            </a:extLst>
+          </a:blip>
+          <a:stretch>
+            <a:fillRect/>
+          </a:stretch>
+        </p:blipFill>
+        <p:spPr>
+          <a:xfrm>
+            <a:off x="2502151" y="1759463"/>
+            <a:ext cx="1080000" cy="1080000"/>
+          </a:xfrm>
+          <a:prstGeom prst="rect">
+            <a:avLst/>
+          </a:prstGeom>
+        </p:spPr>
+      </p:pic>
+      <p:sp>
+        <p:nvSpPr>
+          <p:cNvPr id="12" name="TextBox 11"/>
+          <p:cNvSpPr txBox="1"/>
+          <p:nvPr/>
+        </p:nvSpPr>
+        <p:spPr>
+          <a:xfrm>
+            <a:off x="2350005" y="2854140"/>
+            <a:ext cx="1334881" cy="369332"/>
+          </a:xfrm>
+          <a:prstGeom prst="rect">
+            <a:avLst/>
+          </a:prstGeom>
+          <a:noFill/>
+        </p:spPr>
+        <p:txBody>
+          <a:bodyPr wrap="square" rtlCol="0">
+            <a:spAutoFit/>
+          </a:bodyPr>
+          <a:lstStyle/>
+          <a:p>
+            <a:pPr algn="ctr"/>
+            <a:r>
+              <a:rPr lang="en-US" dirty="0" smtClean="0">
+                <a:solidFill>
+                  <a:schemeClr val="bg1"/>
+                </a:solidFill>
+              </a:rPr>
+              <a:t>Web Page</a:t>
+            </a:r>
+            <a:endParaRPr lang="en-US" dirty="0">
+              <a:solidFill>
+                <a:schemeClr val="bg1"/>
+              </a:solidFill>
+            </a:endParaRPr>
+          </a:p>
+        </p:txBody>
+      </p:sp>
+      <p:sp>
+        <p:nvSpPr>
+          <p:cNvPr id="13" name="TextBox 12"/>
+          <p:cNvSpPr txBox="1"/>
+          <p:nvPr/>
+        </p:nvSpPr>
+        <p:spPr>
+          <a:xfrm>
+            <a:off x="4966078" y="2877514"/>
+            <a:ext cx="1917322" cy="369332"/>
+          </a:xfrm>
+          <a:prstGeom prst="rect">
+            <a:avLst/>
+          </a:prstGeom>
+          <a:noFill/>
+        </p:spPr>
+        <p:txBody>
+          <a:bodyPr wrap="square" rtlCol="0">
+            <a:spAutoFit/>
+          </a:bodyPr>
+          <a:lstStyle/>
+          <a:p>
+            <a:pPr algn="ctr"/>
+            <a:r>
+              <a:rPr lang="en-US" dirty="0" smtClean="0">
+                <a:solidFill>
+                  <a:schemeClr val="bg1"/>
+                </a:solidFill>
+              </a:rPr>
+              <a:t>Service Worker</a:t>
+            </a:r>
+            <a:endParaRPr lang="en-US" dirty="0">
+              <a:solidFill>
+                <a:schemeClr val="bg1"/>
+              </a:solidFill>
+            </a:endParaRPr>
+          </a:p>
+        </p:txBody>
+      </p:sp>
+      <p:pic>
+        <p:nvPicPr>
+          <p:cNvPr id="15" name="Picture 14"/>
+          <p:cNvPicPr>
+            <a:picLocks noChangeAspect="1"/>
+          </p:cNvPicPr>
+          <p:nvPr/>
+        </p:nvPicPr>
+        <p:blipFill>
+          <a:blip r:embed="rId6">
+            <a:extLst>
+              <a:ext uri="{28A0092B-C50C-407E-A947-70E740481C1C}">
+                <a14:useLocalDpi xmlns:a14="http://schemas.microsoft.com/office/drawing/2010/main" val="0"/>
+              </a:ext>
+            </a:extLst>
+          </a:blip>
+          <a:stretch>
+            <a:fillRect/>
+          </a:stretch>
+        </p:blipFill>
+        <p:spPr>
+          <a:xfrm>
+            <a:off x="8674100" y="1759463"/>
+            <a:ext cx="1080000" cy="1080000"/>
+          </a:xfrm>
+          <a:prstGeom prst="rect">
+            <a:avLst/>
+          </a:prstGeom>
+        </p:spPr>
+      </p:pic>
+      <p:sp>
+        <p:nvSpPr>
+          <p:cNvPr id="17" name="TextBox 16"/>
+          <p:cNvSpPr txBox="1"/>
+          <p:nvPr/>
+        </p:nvSpPr>
+        <p:spPr>
+          <a:xfrm>
+            <a:off x="5273923" y="5454651"/>
+            <a:ext cx="1130298" cy="369332"/>
+          </a:xfrm>
+          <a:prstGeom prst="rect">
+            <a:avLst/>
+          </a:prstGeom>
+          <a:noFill/>
+        </p:spPr>
+        <p:txBody>
+          <a:bodyPr wrap="square" rtlCol="0">
+            <a:spAutoFit/>
+          </a:bodyPr>
+          <a:lstStyle/>
+          <a:p>
+            <a:pPr algn="ctr"/>
+            <a:r>
+              <a:rPr lang="en-US" dirty="0" smtClean="0">
+                <a:solidFill>
+                  <a:schemeClr val="bg1"/>
+                </a:solidFill>
+              </a:rPr>
+              <a:t>Cache</a:t>
+            </a:r>
+            <a:endParaRPr lang="en-US" dirty="0">
+              <a:solidFill>
+                <a:schemeClr val="bg1"/>
+              </a:solidFill>
+            </a:endParaRPr>
+          </a:p>
+        </p:txBody>
+      </p:sp>
+      <p:sp>
+        <p:nvSpPr>
+          <p:cNvPr id="18" name="TextBox 17"/>
+          <p:cNvSpPr txBox="1"/>
+          <p:nvPr/>
+        </p:nvSpPr>
+        <p:spPr>
+          <a:xfrm>
+            <a:off x="8415586" y="2834126"/>
+            <a:ext cx="1597028" cy="369332"/>
+          </a:xfrm>
+          <a:prstGeom prst="rect">
+            <a:avLst/>
+          </a:prstGeom>
+          <a:noFill/>
+        </p:spPr>
+        <p:txBody>
+          <a:bodyPr wrap="square" rtlCol="0">
+            <a:spAutoFit/>
+          </a:bodyPr>
+          <a:lstStyle/>
+          <a:p>
+            <a:pPr algn="ctr"/>
+            <a:r>
+              <a:rPr lang="en-US" dirty="0" smtClean="0">
+                <a:solidFill>
+                  <a:schemeClr val="bg1"/>
+                </a:solidFill>
+              </a:rPr>
+              <a:t>Network</a:t>
+            </a:r>
+          </a:p>
+        </p:txBody>
+      </p:sp>
+      <p:cxnSp>
+        <p:nvCxnSpPr>
+          <p:cNvPr id="20" name="Straight Arrow Connector 19"/>
+          <p:cNvCxnSpPr/>
+          <p:nvPr/>
+        </p:nvCxnSpPr>
+        <p:spPr>
+          <a:xfrm>
+            <a:off x="3746500" y="2299463"/>
+            <a:ext cx="1294058" cy="0"/>
+          </a:xfrm>
+          <a:prstGeom prst="straightConnector1">
+            <a:avLst/>
+          </a:prstGeom>
+          <a:ln w="38100">
+            <a:solidFill>
+              <a:schemeClr val="bg1"/>
+            </a:solidFill>
+            <a:headEnd type="none" w="med" len="med"/>
+            <a:tailEnd type="triangle" w="med" len="med"/>
+          </a:ln>
+        </p:spPr>
+        <p:style>
+          <a:lnRef idx="1">
+            <a:schemeClr val="accent1"/>
+          </a:lnRef>
+          <a:fillRef idx="0">
+            <a:schemeClr val="accent1"/>
+          </a:fillRef>
+          <a:effectRef idx="0">
+            <a:schemeClr val="accent1"/>
+          </a:effectRef>
+          <a:fontRef idx="minor">
+            <a:schemeClr val="tx1"/>
+          </a:fontRef>
+        </p:style>
+      </p:cxnSp>
+      <p:cxnSp>
+        <p:nvCxnSpPr>
+          <p:cNvPr id="23" name="Straight Arrow Connector 22"/>
+          <p:cNvCxnSpPr/>
+          <p:nvPr/>
+        </p:nvCxnSpPr>
+        <p:spPr>
+          <a:xfrm flipV="1">
+            <a:off x="6637586" y="2299463"/>
+            <a:ext cx="1778000" cy="13463"/>
+          </a:xfrm>
+          <a:prstGeom prst="straightConnector1">
+            <a:avLst/>
+          </a:prstGeom>
+          <a:ln w="38100">
+            <a:solidFill>
+              <a:schemeClr val="bg1"/>
+            </a:solidFill>
+            <a:headEnd type="none" w="med" len="med"/>
+            <a:tailEnd type="triangle" w="med" len="med"/>
+          </a:ln>
+        </p:spPr>
+        <p:style>
+          <a:lnRef idx="1">
+            <a:schemeClr val="accent1"/>
+          </a:lnRef>
+          <a:fillRef idx="0">
+            <a:schemeClr val="accent1"/>
+          </a:fillRef>
+          <a:effectRef idx="0">
+            <a:schemeClr val="accent1"/>
+          </a:effectRef>
+          <a:fontRef idx="minor">
+            <a:schemeClr val="tx1"/>
+          </a:fontRef>
+        </p:style>
+      </p:cxnSp>
+      <p:cxnSp>
+        <p:nvCxnSpPr>
+          <p:cNvPr id="28" name="Straight Arrow Connector 27"/>
+          <p:cNvCxnSpPr/>
+          <p:nvPr/>
+        </p:nvCxnSpPr>
+        <p:spPr>
+          <a:xfrm>
+            <a:off x="5839072" y="3340100"/>
+            <a:ext cx="0" cy="800100"/>
+          </a:xfrm>
+          <a:prstGeom prst="straightConnector1">
+            <a:avLst/>
+          </a:prstGeom>
+          <a:ln w="38100">
+            <a:solidFill>
+              <a:schemeClr val="bg1"/>
+            </a:solidFill>
+            <a:headEnd type="none" w="med" len="med"/>
+            <a:tailEnd type="triangle" w="med" len="med"/>
+          </a:ln>
+        </p:spPr>
+        <p:style>
+          <a:lnRef idx="1">
+            <a:schemeClr val="accent1"/>
+          </a:lnRef>
+          <a:fillRef idx="0">
+            <a:schemeClr val="accent1"/>
+          </a:fillRef>
+          <a:effectRef idx="0">
+            <a:schemeClr val="accent1"/>
+          </a:effectRef>
+          <a:fontRef idx="minor">
+            <a:schemeClr val="tx1"/>
+          </a:fontRef>
+        </p:style>
+      </p:cxnSp>
+      <p:cxnSp>
+        <p:nvCxnSpPr>
+          <p:cNvPr id="3" name="Straight Connector 2"/>
+          <p:cNvCxnSpPr/>
+          <p:nvPr/>
+        </p:nvCxnSpPr>
+        <p:spPr>
+          <a:xfrm>
+            <a:off x="7366000" y="1168400"/>
+            <a:ext cx="0" cy="4800600"/>
+          </a:xfrm>
+          <a:prstGeom prst="line">
+            <a:avLst/>
+          </a:prstGeom>
+          <a:ln w="28575">
+            <a:solidFill>
+              <a:schemeClr val="bg1">
+                <a:lumMod val="75000"/>
+              </a:schemeClr>
+            </a:solidFill>
+            <a:prstDash val="dashDot"/>
+          </a:ln>
+        </p:spPr>
+        <p:style>
+          <a:lnRef idx="1">
+            <a:schemeClr val="accent1"/>
+          </a:lnRef>
+          <a:fillRef idx="0">
+            <a:schemeClr val="accent1"/>
+          </a:fillRef>
+          <a:effectRef idx="0">
+            <a:schemeClr val="accent1"/>
+          </a:effectRef>
+          <a:fontRef idx="minor">
+            <a:schemeClr val="tx1"/>
+          </a:fontRef>
+        </p:style>
+      </p:cxnSp>
+      <p:sp>
+        <p:nvSpPr>
+          <p:cNvPr id="2" name="TextBox 1"/>
+          <p:cNvSpPr txBox="1"/>
+          <p:nvPr/>
+        </p:nvSpPr>
+        <p:spPr>
+          <a:xfrm>
+            <a:off x="8272430" y="1961926"/>
+            <a:ext cx="466794" cy="707886"/>
+          </a:xfrm>
+          <a:prstGeom prst="rect">
+            <a:avLst/>
+          </a:prstGeom>
+          <a:noFill/>
+        </p:spPr>
+        <p:txBody>
+          <a:bodyPr wrap="none" rtlCol="0">
+            <a:spAutoFit/>
+          </a:bodyPr>
+          <a:lstStyle/>
+          <a:p>
+            <a:r>
+              <a:rPr lang="en-US" sz="4000" b="1" dirty="0" smtClean="0">
+                <a:solidFill>
+                  <a:srgbClr val="FF0000"/>
+                </a:solidFill>
+              </a:rPr>
+              <a:t>X</a:t>
+            </a:r>
+            <a:endParaRPr lang="en-US" sz="2800" b="1" dirty="0">
+              <a:solidFill>
+                <a:srgbClr val="FF0000"/>
+              </a:solidFill>
+            </a:endParaRPr>
+          </a:p>
+        </p:txBody>
+      </p:sp>
+      <p:sp>
+        <p:nvSpPr>
+          <p:cNvPr id="4" name="TextBox 3"/>
+          <p:cNvSpPr txBox="1"/>
+          <p:nvPr/>
+        </p:nvSpPr>
+        <p:spPr>
+          <a:xfrm>
+            <a:off x="4279884" y="1943594"/>
+            <a:ext cx="301686" cy="369332"/>
+          </a:xfrm>
+          <a:prstGeom prst="rect">
+            <a:avLst/>
+          </a:prstGeom>
+          <a:noFill/>
+        </p:spPr>
+        <p:txBody>
+          <a:bodyPr wrap="none" rtlCol="0">
+            <a:spAutoFit/>
+          </a:bodyPr>
+          <a:lstStyle/>
+          <a:p>
+            <a:r>
+              <a:rPr lang="en-US" dirty="0" smtClean="0">
+                <a:solidFill>
+                  <a:schemeClr val="bg1"/>
+                </a:solidFill>
+              </a:rPr>
+              <a:t>1</a:t>
+            </a:r>
+            <a:endParaRPr lang="en-US" dirty="0">
+              <a:solidFill>
+                <a:schemeClr val="bg1"/>
+              </a:solidFill>
+            </a:endParaRPr>
+          </a:p>
+        </p:txBody>
+      </p:sp>
+      <p:sp>
+        <p:nvSpPr>
+          <p:cNvPr id="16" name="TextBox 15"/>
+          <p:cNvSpPr txBox="1"/>
+          <p:nvPr/>
+        </p:nvSpPr>
+        <p:spPr>
+          <a:xfrm>
+            <a:off x="5473580" y="3547637"/>
+            <a:ext cx="301686" cy="369332"/>
+          </a:xfrm>
+          <a:prstGeom prst="rect">
+            <a:avLst/>
+          </a:prstGeom>
+          <a:noFill/>
+        </p:spPr>
+        <p:txBody>
+          <a:bodyPr wrap="none" rtlCol="0">
+            <a:spAutoFit/>
+          </a:bodyPr>
+          <a:lstStyle/>
+          <a:p>
+            <a:r>
+              <a:rPr lang="en-US" dirty="0" smtClean="0">
+                <a:solidFill>
+                  <a:schemeClr val="bg1"/>
+                </a:solidFill>
+              </a:rPr>
+              <a:t>3</a:t>
+            </a:r>
+            <a:endParaRPr lang="en-US" dirty="0">
+              <a:solidFill>
+                <a:schemeClr val="bg1"/>
+              </a:solidFill>
+            </a:endParaRPr>
+          </a:p>
+        </p:txBody>
+      </p:sp>
+      <p:cxnSp>
+        <p:nvCxnSpPr>
+          <p:cNvPr id="6" name="Curved Connector 5"/>
+          <p:cNvCxnSpPr>
+            <a:endCxn id="12" idx="2"/>
+          </p:cNvCxnSpPr>
+          <p:nvPr/>
+        </p:nvCxnSpPr>
+        <p:spPr>
+          <a:xfrm rot="10800000">
+            <a:off x="3017446" y="3223473"/>
+            <a:ext cx="1795860" cy="1693413"/>
+          </a:xfrm>
+          <a:prstGeom prst="curvedConnector2">
+            <a:avLst/>
+          </a:prstGeom>
+          <a:ln w="38100">
+            <a:solidFill>
+              <a:schemeClr val="bg1"/>
+            </a:solidFill>
+            <a:tailEnd type="triangle"/>
+          </a:ln>
+        </p:spPr>
+        <p:style>
+          <a:lnRef idx="1">
+            <a:schemeClr val="accent1"/>
+          </a:lnRef>
+          <a:fillRef idx="0">
+            <a:schemeClr val="accent1"/>
+          </a:fillRef>
+          <a:effectRef idx="0">
+            <a:schemeClr val="accent1"/>
+          </a:effectRef>
+          <a:fontRef idx="minor">
+            <a:schemeClr val="tx1"/>
+          </a:fontRef>
+        </p:style>
+      </p:cxnSp>
+      <p:sp>
+        <p:nvSpPr>
+          <p:cNvPr id="21" name="TextBox 20"/>
+          <p:cNvSpPr txBox="1"/>
+          <p:nvPr/>
+        </p:nvSpPr>
+        <p:spPr>
+          <a:xfrm>
+            <a:off x="3305614" y="4331723"/>
+            <a:ext cx="301686" cy="369332"/>
+          </a:xfrm>
+          <a:prstGeom prst="rect">
+            <a:avLst/>
+          </a:prstGeom>
+          <a:noFill/>
+        </p:spPr>
+        <p:txBody>
+          <a:bodyPr wrap="none" rtlCol="0">
+            <a:spAutoFit/>
+          </a:bodyPr>
+          <a:lstStyle/>
+          <a:p>
+            <a:r>
+              <a:rPr lang="en-US" dirty="0" smtClean="0">
+                <a:solidFill>
+                  <a:schemeClr val="bg1"/>
+                </a:solidFill>
+              </a:rPr>
+              <a:t>4</a:t>
+            </a:r>
+            <a:endParaRPr lang="en-US" dirty="0">
+              <a:solidFill>
+                <a:schemeClr val="bg1"/>
+              </a:solidFill>
+            </a:endParaRPr>
+          </a:p>
+        </p:txBody>
+      </p:sp>
+      <p:sp>
+        <p:nvSpPr>
+          <p:cNvPr id="29" name="TextBox 28"/>
+          <p:cNvSpPr txBox="1"/>
+          <p:nvPr/>
+        </p:nvSpPr>
+        <p:spPr>
+          <a:xfrm>
+            <a:off x="7527582" y="1951992"/>
+            <a:ext cx="301686" cy="369332"/>
+          </a:xfrm>
+          <a:prstGeom prst="rect">
+            <a:avLst/>
+          </a:prstGeom>
+          <a:noFill/>
+        </p:spPr>
+        <p:txBody>
+          <a:bodyPr wrap="none" rtlCol="0">
+            <a:spAutoFit/>
+          </a:bodyPr>
+          <a:lstStyle/>
+          <a:p>
+            <a:r>
+              <a:rPr lang="en-US" dirty="0" smtClean="0">
+                <a:solidFill>
+                  <a:schemeClr val="bg1"/>
+                </a:solidFill>
+              </a:rPr>
+              <a:t>2</a:t>
+            </a:r>
+            <a:endParaRPr lang="en-US" dirty="0">
+              <a:solidFill>
+                <a:schemeClr val="bg1"/>
+              </a:solidFill>
+            </a:endParaRPr>
+          </a:p>
+        </p:txBody>
+      </p:sp>
+    </p:spTree>
+    <p:extLst>
+      <p:ext uri="{BB962C8B-B14F-4D97-AF65-F5344CB8AC3E}">
+        <p14:creationId xmlns:p14="http://schemas.microsoft.com/office/powerpoint/2010/main" val="1416608202"/>
+      </p:ext>
+    </p:extLst>
+  </p:cSld>
+  <p:clrMapOvr>
+    <a:masterClrMapping/>
+  </p:clrMapOvr>
+</p:sld>
+</file>
+
+<file path=ppt/slides/slide7.xml><?xml version="1.0" encoding="utf-8"?>
+<p:sld xmlns:a="http://schemas.openxmlformats.org/drawingml/2006/main" xmlns:r="http://schemas.openxmlformats.org/officeDocument/2006/relationships" xmlns:p="http://schemas.openxmlformats.org/presentationml/2006/main">
+  <p:cSld>
+    <p:bg>
+      <p:bgPr>
+        <a:solidFill>
+          <a:schemeClr val="accent5"/>
+        </a:solidFill>
+        <a:effectLst/>
+      </p:bgPr>
+    </p:bg>
+    <p:spTree>
+      <p:nvGrpSpPr>
+        <p:cNvPr id="1" name=""/>
+        <p:cNvGrpSpPr/>
+        <p:nvPr/>
+      </p:nvGrpSpPr>
+      <p:grpSpPr>
+        <a:xfrm>
+          <a:off x="0" y="0"/>
+          <a:ext cx="0" cy="0"/>
+          <a:chOff x="0" y="0"/>
+          <a:chExt cx="0" cy="0"/>
+        </a:xfrm>
+      </p:grpSpPr>
+      <p:pic>
+        <p:nvPicPr>
+          <p:cNvPr id="8" name="Picture 7"/>
+          <p:cNvPicPr>
+            <a:picLocks noChangeAspect="1"/>
+          </p:cNvPicPr>
+          <p:nvPr/>
+        </p:nvPicPr>
+        <p:blipFill>
+          <a:blip r:embed="rId3">
+            <a:extLst>
+              <a:ext uri="{28A0092B-C50C-407E-A947-70E740481C1C}">
+                <a14:useLocalDpi xmlns:a14="http://schemas.microsoft.com/office/drawing/2010/main" val="0"/>
+              </a:ext>
+            </a:extLst>
+          </a:blip>
+          <a:stretch>
+            <a:fillRect/>
+          </a:stretch>
+        </p:blipFill>
+        <p:spPr>
+          <a:xfrm>
+            <a:off x="5257494" y="3952002"/>
+            <a:ext cx="1080000" cy="1080000"/>
+          </a:xfrm>
+          <a:prstGeom prst="rect">
+            <a:avLst/>
+          </a:prstGeom>
+        </p:spPr>
+      </p:pic>
+      <p:pic>
+        <p:nvPicPr>
+          <p:cNvPr id="10" name="Picture 9"/>
+          <p:cNvPicPr>
+            <a:picLocks noChangeAspect="1"/>
+          </p:cNvPicPr>
+          <p:nvPr/>
+        </p:nvPicPr>
+        <p:blipFill>
+          <a:blip r:embed="rId4">
+            <a:extLst>
+              <a:ext uri="{28A0092B-C50C-407E-A947-70E740481C1C}">
+                <a14:useLocalDpi xmlns:a14="http://schemas.microsoft.com/office/drawing/2010/main" val="0"/>
+              </a:ext>
+            </a:extLst>
+          </a:blip>
+          <a:stretch>
+            <a:fillRect/>
+          </a:stretch>
+        </p:blipFill>
+        <p:spPr>
+          <a:xfrm>
+            <a:off x="5282643" y="1387113"/>
+            <a:ext cx="1080000" cy="1080000"/>
+          </a:xfrm>
+          <a:prstGeom prst="rect">
+            <a:avLst/>
+          </a:prstGeom>
+        </p:spPr>
+      </p:pic>
+      <p:pic>
+        <p:nvPicPr>
+          <p:cNvPr id="11" name="Picture 10"/>
+          <p:cNvPicPr>
+            <a:picLocks noChangeAspect="1"/>
+          </p:cNvPicPr>
+          <p:nvPr/>
+        </p:nvPicPr>
+        <p:blipFill>
+          <a:blip r:embed="rId5">
+            <a:extLst>
+              <a:ext uri="{28A0092B-C50C-407E-A947-70E740481C1C}">
+                <a14:useLocalDpi xmlns:a14="http://schemas.microsoft.com/office/drawing/2010/main" val="0"/>
+              </a:ext>
+            </a:extLst>
+          </a:blip>
+          <a:stretch>
+            <a:fillRect/>
+          </a:stretch>
+        </p:blipFill>
+        <p:spPr>
+          <a:xfrm>
+            <a:off x="2157409" y="2673863"/>
+            <a:ext cx="1080000" cy="1080000"/>
+          </a:xfrm>
+          <a:prstGeom prst="rect">
+            <a:avLst/>
+          </a:prstGeom>
+        </p:spPr>
+      </p:pic>
+      <p:sp>
+        <p:nvSpPr>
+          <p:cNvPr id="12" name="TextBox 11"/>
+          <p:cNvSpPr txBox="1"/>
+          <p:nvPr/>
+        </p:nvSpPr>
+        <p:spPr>
+          <a:xfrm>
+            <a:off x="1914220" y="3780812"/>
+            <a:ext cx="1459158" cy="369332"/>
+          </a:xfrm>
+          <a:prstGeom prst="rect">
+            <a:avLst/>
+          </a:prstGeom>
+          <a:noFill/>
+        </p:spPr>
+        <p:txBody>
+          <a:bodyPr wrap="square" rtlCol="0">
+            <a:spAutoFit/>
+          </a:bodyPr>
+          <a:lstStyle/>
+          <a:p>
+            <a:pPr algn="ctr"/>
+            <a:r>
+              <a:rPr lang="en-US" dirty="0" smtClean="0">
+                <a:solidFill>
+                  <a:schemeClr val="bg1"/>
+                </a:solidFill>
+              </a:rPr>
+              <a:t>Web Page</a:t>
+            </a:r>
+            <a:endParaRPr lang="en-US" dirty="0">
+              <a:solidFill>
+                <a:schemeClr val="bg1"/>
+              </a:solidFill>
+            </a:endParaRPr>
+          </a:p>
+        </p:txBody>
+      </p:sp>
+      <p:sp>
+        <p:nvSpPr>
+          <p:cNvPr id="13" name="TextBox 12"/>
+          <p:cNvSpPr txBox="1"/>
+          <p:nvPr/>
+        </p:nvSpPr>
+        <p:spPr>
+          <a:xfrm>
+            <a:off x="4998980" y="2467113"/>
+            <a:ext cx="1597028" cy="369332"/>
+          </a:xfrm>
+          <a:prstGeom prst="rect">
+            <a:avLst/>
+          </a:prstGeom>
+          <a:noFill/>
+        </p:spPr>
+        <p:txBody>
+          <a:bodyPr wrap="square" rtlCol="0">
+            <a:spAutoFit/>
+          </a:bodyPr>
+          <a:lstStyle/>
+          <a:p>
+            <a:pPr algn="ctr"/>
+            <a:r>
+              <a:rPr lang="en-US" dirty="0" smtClean="0">
+                <a:solidFill>
+                  <a:schemeClr val="bg1"/>
+                </a:solidFill>
+              </a:rPr>
+              <a:t>Service Worker</a:t>
+            </a:r>
+            <a:endParaRPr lang="en-US" dirty="0">
+              <a:solidFill>
+                <a:schemeClr val="bg1"/>
+              </a:solidFill>
+            </a:endParaRPr>
+          </a:p>
+        </p:txBody>
+      </p:sp>
+      <p:pic>
+        <p:nvPicPr>
+          <p:cNvPr id="15" name="Picture 14"/>
+          <p:cNvPicPr>
+            <a:picLocks noChangeAspect="1"/>
+          </p:cNvPicPr>
+          <p:nvPr/>
+        </p:nvPicPr>
+        <p:blipFill>
+          <a:blip r:embed="rId6">
+            <a:extLst>
+              <a:ext uri="{28A0092B-C50C-407E-A947-70E740481C1C}">
+                <a14:useLocalDpi xmlns:a14="http://schemas.microsoft.com/office/drawing/2010/main" val="0"/>
+              </a:ext>
+            </a:extLst>
+          </a:blip>
+          <a:stretch>
+            <a:fillRect/>
+          </a:stretch>
+        </p:blipFill>
+        <p:spPr>
+          <a:xfrm>
+            <a:off x="8674100" y="2679200"/>
+            <a:ext cx="1080000" cy="1080000"/>
+          </a:xfrm>
+          <a:prstGeom prst="rect">
+            <a:avLst/>
+          </a:prstGeom>
+        </p:spPr>
+      </p:pic>
+      <p:sp>
+        <p:nvSpPr>
+          <p:cNvPr id="17" name="TextBox 16"/>
+          <p:cNvSpPr txBox="1"/>
+          <p:nvPr/>
+        </p:nvSpPr>
+        <p:spPr>
+          <a:xfrm>
+            <a:off x="5232345" y="5082301"/>
+            <a:ext cx="1130298" cy="369332"/>
+          </a:xfrm>
+          <a:prstGeom prst="rect">
+            <a:avLst/>
+          </a:prstGeom>
+          <a:noFill/>
+        </p:spPr>
+        <p:txBody>
+          <a:bodyPr wrap="square" rtlCol="0">
+            <a:spAutoFit/>
+          </a:bodyPr>
+          <a:lstStyle/>
+          <a:p>
+            <a:pPr algn="ctr"/>
+            <a:r>
+              <a:rPr lang="en-US" dirty="0" smtClean="0">
+                <a:solidFill>
+                  <a:schemeClr val="bg1"/>
+                </a:solidFill>
+              </a:rPr>
+              <a:t>Cache</a:t>
+            </a:r>
+            <a:endParaRPr lang="en-US" dirty="0">
+              <a:solidFill>
+                <a:schemeClr val="bg1"/>
+              </a:solidFill>
+            </a:endParaRPr>
+          </a:p>
+        </p:txBody>
+      </p:sp>
+      <p:sp>
+        <p:nvSpPr>
+          <p:cNvPr id="18" name="TextBox 17"/>
+          <p:cNvSpPr txBox="1"/>
+          <p:nvPr/>
+        </p:nvSpPr>
+        <p:spPr>
+          <a:xfrm>
+            <a:off x="8415586" y="3753863"/>
+            <a:ext cx="1597028" cy="369332"/>
+          </a:xfrm>
+          <a:prstGeom prst="rect">
+            <a:avLst/>
+          </a:prstGeom>
+          <a:noFill/>
+        </p:spPr>
+        <p:txBody>
+          <a:bodyPr wrap="square" rtlCol="0">
+            <a:spAutoFit/>
+          </a:bodyPr>
+          <a:lstStyle/>
+          <a:p>
+            <a:pPr algn="ctr"/>
+            <a:r>
+              <a:rPr lang="en-US" dirty="0" smtClean="0">
+                <a:solidFill>
+                  <a:schemeClr val="bg1"/>
+                </a:solidFill>
+              </a:rPr>
+              <a:t>Network</a:t>
+            </a:r>
+          </a:p>
+        </p:txBody>
+      </p:sp>
+      <p:cxnSp>
+        <p:nvCxnSpPr>
+          <p:cNvPr id="22" name="Curved Connector 21"/>
+          <p:cNvCxnSpPr/>
+          <p:nvPr/>
+        </p:nvCxnSpPr>
+        <p:spPr>
+          <a:xfrm rot="5400000" flipH="1" flipV="1">
+            <a:off x="3474867" y="820457"/>
+            <a:ext cx="666500" cy="2626812"/>
+          </a:xfrm>
+          <a:prstGeom prst="curvedConnector2">
+            <a:avLst/>
+          </a:prstGeom>
+          <a:ln w="38100">
+            <a:solidFill>
+              <a:schemeClr val="bg1"/>
+            </a:solidFill>
+            <a:tailEnd type="triangle"/>
+          </a:ln>
+        </p:spPr>
+        <p:style>
+          <a:lnRef idx="1">
+            <a:schemeClr val="accent1"/>
+          </a:lnRef>
+          <a:fillRef idx="0">
+            <a:schemeClr val="accent1"/>
+          </a:fillRef>
+          <a:effectRef idx="0">
+            <a:schemeClr val="accent1"/>
+          </a:effectRef>
+          <a:fontRef idx="minor">
+            <a:schemeClr val="tx1"/>
+          </a:fontRef>
+        </p:style>
+      </p:cxnSp>
+      <p:cxnSp>
+        <p:nvCxnSpPr>
+          <p:cNvPr id="25" name="Curved Connector 24"/>
+          <p:cNvCxnSpPr>
+            <a:stCxn id="12" idx="2"/>
+          </p:cNvCxnSpPr>
+          <p:nvPr/>
+        </p:nvCxnSpPr>
+        <p:spPr>
+          <a:xfrm rot="16200000" flipH="1">
+            <a:off x="3713544" y="3080399"/>
+            <a:ext cx="449056" cy="2588546"/>
+          </a:xfrm>
+          <a:prstGeom prst="curvedConnector2">
+            <a:avLst/>
+          </a:prstGeom>
+          <a:ln w="38100">
+            <a:solidFill>
+              <a:schemeClr val="bg1"/>
+            </a:solidFill>
+            <a:tailEnd type="triangle"/>
+          </a:ln>
+        </p:spPr>
+        <p:style>
+          <a:lnRef idx="1">
+            <a:schemeClr val="accent1"/>
+          </a:lnRef>
+          <a:fillRef idx="0">
+            <a:schemeClr val="accent1"/>
+          </a:fillRef>
+          <a:effectRef idx="0">
+            <a:schemeClr val="accent1"/>
+          </a:effectRef>
+          <a:fontRef idx="minor">
+            <a:schemeClr val="tx1"/>
+          </a:fontRef>
+        </p:style>
+      </p:cxnSp>
+      <p:cxnSp>
+        <p:nvCxnSpPr>
+          <p:cNvPr id="29" name="Curved Connector 28"/>
+          <p:cNvCxnSpPr/>
+          <p:nvPr/>
+        </p:nvCxnSpPr>
+        <p:spPr>
+          <a:xfrm>
+            <a:off x="6596008" y="1800613"/>
+            <a:ext cx="2618092" cy="781930"/>
+          </a:xfrm>
+          <a:prstGeom prst="curvedConnector2">
+            <a:avLst/>
+          </a:prstGeom>
+          <a:ln w="38100">
+            <a:solidFill>
+              <a:schemeClr val="bg1"/>
+            </a:solidFill>
+            <a:tailEnd type="triangle"/>
+          </a:ln>
+        </p:spPr>
+        <p:style>
+          <a:lnRef idx="1">
+            <a:schemeClr val="accent1"/>
+          </a:lnRef>
+          <a:fillRef idx="0">
+            <a:schemeClr val="accent1"/>
+          </a:fillRef>
+          <a:effectRef idx="0">
+            <a:schemeClr val="accent1"/>
+          </a:effectRef>
+          <a:fontRef idx="minor">
+            <a:schemeClr val="tx1"/>
+          </a:fontRef>
+        </p:style>
+      </p:cxnSp>
+      <p:cxnSp>
+        <p:nvCxnSpPr>
+          <p:cNvPr id="33" name="Straight Arrow Connector 32"/>
+          <p:cNvCxnSpPr/>
+          <p:nvPr/>
+        </p:nvCxnSpPr>
+        <p:spPr>
+          <a:xfrm flipH="1" flipV="1">
+            <a:off x="3403054" y="3213298"/>
+            <a:ext cx="5105400" cy="1129"/>
+          </a:xfrm>
+          <a:prstGeom prst="straightConnector1">
+            <a:avLst/>
+          </a:prstGeom>
+          <a:ln w="38100">
+            <a:solidFill>
+              <a:schemeClr val="bg1"/>
+            </a:solidFill>
+            <a:headEnd type="none" w="med" len="med"/>
+            <a:tailEnd type="triangle" w="med" len="med"/>
+          </a:ln>
+        </p:spPr>
+        <p:style>
+          <a:lnRef idx="1">
+            <a:schemeClr val="accent1"/>
+          </a:lnRef>
+          <a:fillRef idx="0">
+            <a:schemeClr val="accent1"/>
+          </a:fillRef>
+          <a:effectRef idx="0">
+            <a:schemeClr val="accent1"/>
+          </a:effectRef>
+          <a:fontRef idx="minor">
+            <a:schemeClr val="tx1"/>
+          </a:fontRef>
+        </p:style>
+      </p:cxnSp>
+      <p:cxnSp>
+        <p:nvCxnSpPr>
+          <p:cNvPr id="36" name="Curved Connector 35"/>
+          <p:cNvCxnSpPr/>
+          <p:nvPr/>
+        </p:nvCxnSpPr>
+        <p:spPr>
+          <a:xfrm rot="16200000" flipV="1">
+            <a:off x="4347618" y="2514826"/>
+            <a:ext cx="473389" cy="2299364"/>
+          </a:xfrm>
+          <a:prstGeom prst="curvedConnector2">
+            <a:avLst/>
+          </a:prstGeom>
+          <a:ln w="38100">
+            <a:solidFill>
+              <a:schemeClr val="bg1"/>
+            </a:solidFill>
+            <a:tailEnd type="triangle"/>
+          </a:ln>
+        </p:spPr>
+        <p:style>
+          <a:lnRef idx="1">
+            <a:schemeClr val="accent1"/>
+          </a:lnRef>
+          <a:fillRef idx="0">
+            <a:schemeClr val="accent1"/>
+          </a:fillRef>
+          <a:effectRef idx="0">
+            <a:schemeClr val="accent1"/>
+          </a:effectRef>
+          <a:fontRef idx="minor">
+            <a:schemeClr val="tx1"/>
+          </a:fontRef>
+        </p:style>
+      </p:cxnSp>
+      <p:cxnSp>
+        <p:nvCxnSpPr>
+          <p:cNvPr id="39" name="Curved Connector 38"/>
+          <p:cNvCxnSpPr/>
+          <p:nvPr/>
+        </p:nvCxnSpPr>
+        <p:spPr>
+          <a:xfrm rot="10800000" flipV="1">
+            <a:off x="5949894" y="3213294"/>
+            <a:ext cx="1502846" cy="738707"/>
+          </a:xfrm>
+          <a:prstGeom prst="curvedConnector2">
+            <a:avLst/>
+          </a:prstGeom>
+          <a:ln w="38100">
+            <a:solidFill>
+              <a:schemeClr val="bg1"/>
+            </a:solidFill>
+            <a:tailEnd type="triangle"/>
+          </a:ln>
+        </p:spPr>
+        <p:style>
+          <a:lnRef idx="1">
+            <a:schemeClr val="accent1"/>
+          </a:lnRef>
+          <a:fillRef idx="0">
+            <a:schemeClr val="accent1"/>
+          </a:fillRef>
+          <a:effectRef idx="0">
+            <a:schemeClr val="accent1"/>
+          </a:effectRef>
+          <a:fontRef idx="minor">
+            <a:schemeClr val="tx1"/>
+          </a:fontRef>
+        </p:style>
+      </p:cxnSp>
+      <p:sp>
+        <p:nvSpPr>
+          <p:cNvPr id="47" name="TextBox 46"/>
+          <p:cNvSpPr txBox="1"/>
+          <p:nvPr/>
+        </p:nvSpPr>
+        <p:spPr>
+          <a:xfrm>
+            <a:off x="3283787" y="1615945"/>
+            <a:ext cx="301686" cy="369332"/>
+          </a:xfrm>
+          <a:prstGeom prst="rect">
+            <a:avLst/>
+          </a:prstGeom>
+          <a:noFill/>
+        </p:spPr>
+        <p:txBody>
+          <a:bodyPr wrap="none" rtlCol="0">
+            <a:spAutoFit/>
+          </a:bodyPr>
+          <a:lstStyle/>
+          <a:p>
+            <a:r>
+              <a:rPr lang="en-US" dirty="0" smtClean="0">
+                <a:solidFill>
+                  <a:schemeClr val="bg1"/>
+                </a:solidFill>
+              </a:rPr>
+              <a:t>1</a:t>
+            </a:r>
+            <a:endParaRPr lang="en-US" dirty="0">
+              <a:solidFill>
+                <a:schemeClr val="bg1"/>
+              </a:solidFill>
+            </a:endParaRPr>
+          </a:p>
+        </p:txBody>
+      </p:sp>
+      <p:sp>
+        <p:nvSpPr>
+          <p:cNvPr id="48" name="TextBox 47"/>
+          <p:cNvSpPr txBox="1"/>
+          <p:nvPr/>
+        </p:nvSpPr>
+        <p:spPr>
+          <a:xfrm>
+            <a:off x="3451403" y="4447525"/>
+            <a:ext cx="301686" cy="369332"/>
+          </a:xfrm>
+          <a:prstGeom prst="rect">
+            <a:avLst/>
+          </a:prstGeom>
+          <a:noFill/>
+        </p:spPr>
+        <p:txBody>
+          <a:bodyPr wrap="none" rtlCol="0">
+            <a:spAutoFit/>
+          </a:bodyPr>
+          <a:lstStyle/>
+          <a:p>
+            <a:r>
+              <a:rPr lang="en-US" dirty="0" smtClean="0">
+                <a:solidFill>
+                  <a:schemeClr val="bg1"/>
+                </a:solidFill>
+              </a:rPr>
+              <a:t>1</a:t>
+            </a:r>
+            <a:endParaRPr lang="en-US" dirty="0">
+              <a:solidFill>
+                <a:schemeClr val="bg1"/>
+              </a:solidFill>
+            </a:endParaRPr>
+          </a:p>
+        </p:txBody>
+      </p:sp>
+      <p:sp>
+        <p:nvSpPr>
+          <p:cNvPr id="49" name="TextBox 48"/>
+          <p:cNvSpPr txBox="1"/>
+          <p:nvPr/>
+        </p:nvSpPr>
+        <p:spPr>
+          <a:xfrm>
+            <a:off x="4408036" y="3518648"/>
+            <a:ext cx="301686" cy="369332"/>
+          </a:xfrm>
+          <a:prstGeom prst="rect">
+            <a:avLst/>
+          </a:prstGeom>
+          <a:noFill/>
+        </p:spPr>
+        <p:txBody>
+          <a:bodyPr wrap="none" rtlCol="0">
+            <a:spAutoFit/>
+          </a:bodyPr>
+          <a:lstStyle/>
+          <a:p>
+            <a:r>
+              <a:rPr lang="en-US">
+                <a:solidFill>
+                  <a:schemeClr val="bg1"/>
+                </a:solidFill>
+              </a:rPr>
+              <a:t>2</a:t>
+            </a:r>
+            <a:endParaRPr lang="en-US" dirty="0">
+              <a:solidFill>
+                <a:schemeClr val="bg1"/>
+              </a:solidFill>
+            </a:endParaRPr>
+          </a:p>
+        </p:txBody>
+      </p:sp>
+      <p:sp>
+        <p:nvSpPr>
+          <p:cNvPr id="50" name="TextBox 49"/>
+          <p:cNvSpPr txBox="1"/>
+          <p:nvPr/>
+        </p:nvSpPr>
+        <p:spPr>
+          <a:xfrm>
+            <a:off x="7829142" y="1557781"/>
+            <a:ext cx="301686" cy="369332"/>
+          </a:xfrm>
+          <a:prstGeom prst="rect">
+            <a:avLst/>
+          </a:prstGeom>
+          <a:noFill/>
+        </p:spPr>
+        <p:txBody>
+          <a:bodyPr wrap="none" rtlCol="0">
+            <a:spAutoFit/>
+          </a:bodyPr>
+          <a:lstStyle/>
+          <a:p>
+            <a:r>
+              <a:rPr lang="en-US">
+                <a:solidFill>
+                  <a:schemeClr val="bg1"/>
+                </a:solidFill>
+              </a:rPr>
+              <a:t>2</a:t>
+            </a:r>
+            <a:endParaRPr lang="en-US" dirty="0">
+              <a:solidFill>
+                <a:schemeClr val="bg1"/>
+              </a:solidFill>
+            </a:endParaRPr>
+          </a:p>
+        </p:txBody>
+      </p:sp>
+      <p:sp>
+        <p:nvSpPr>
+          <p:cNvPr id="51" name="TextBox 50"/>
+          <p:cNvSpPr txBox="1"/>
+          <p:nvPr/>
+        </p:nvSpPr>
+        <p:spPr>
+          <a:xfrm>
+            <a:off x="7233877" y="2846508"/>
+            <a:ext cx="301686" cy="369332"/>
+          </a:xfrm>
+          <a:prstGeom prst="rect">
+            <a:avLst/>
+          </a:prstGeom>
+          <a:noFill/>
+        </p:spPr>
+        <p:txBody>
+          <a:bodyPr wrap="none" rtlCol="0">
+            <a:spAutoFit/>
+          </a:bodyPr>
+          <a:lstStyle/>
+          <a:p>
+            <a:r>
+              <a:rPr lang="en-US" dirty="0" smtClean="0">
+                <a:solidFill>
+                  <a:schemeClr val="bg1"/>
+                </a:solidFill>
+              </a:rPr>
+              <a:t>3</a:t>
+            </a:r>
+            <a:endParaRPr lang="en-US" dirty="0">
+              <a:solidFill>
+                <a:schemeClr val="bg1"/>
+              </a:solidFill>
+            </a:endParaRPr>
+          </a:p>
+        </p:txBody>
+      </p:sp>
+    </p:spTree>
+    <p:extLst>
+      <p:ext uri="{BB962C8B-B14F-4D97-AF65-F5344CB8AC3E}">
+        <p14:creationId xmlns:p14="http://schemas.microsoft.com/office/powerpoint/2010/main" val="2070321081"/>
+      </p:ext>
+    </p:extLst>
+  </p:cSld>
+  <p:clrMapOvr>
+    <a:masterClrMapping/>
+  </p:clrMapOvr>
+</p:sld>
+</file>
+
+<file path=ppt/slides/slide8.xml><?xml version="1.0" encoding="utf-8"?>
+<p:sld xmlns:a="http://schemas.openxmlformats.org/drawingml/2006/main" xmlns:r="http://schemas.openxmlformats.org/officeDocument/2006/relationships" xmlns:p="http://schemas.openxmlformats.org/presentationml/2006/main">
+  <p:cSld>
+    <p:bg>
+      <p:bgPr>
+        <a:solidFill>
+          <a:schemeClr val="accent5"/>
+        </a:solidFill>
+        <a:effectLst/>
+      </p:bgPr>
+    </p:bg>
+    <p:spTree>
+      <p:nvGrpSpPr>
+        <p:cNvPr id="1" name=""/>
+        <p:cNvGrpSpPr/>
+        <p:nvPr/>
+      </p:nvGrpSpPr>
+      <p:grpSpPr>
+        <a:xfrm>
+          <a:off x="0" y="0"/>
+          <a:ext cx="0" cy="0"/>
+          <a:chOff x="0" y="0"/>
+          <a:chExt cx="0" cy="0"/>
+        </a:xfrm>
+      </p:grpSpPr>
+      <p:pic>
+        <p:nvPicPr>
+          <p:cNvPr id="8" name="Picture 7"/>
+          <p:cNvPicPr>
+            <a:picLocks noChangeAspect="1"/>
+          </p:cNvPicPr>
+          <p:nvPr/>
+        </p:nvPicPr>
+        <p:blipFill>
+          <a:blip r:embed="rId3">
+            <a:extLst>
+              <a:ext uri="{28A0092B-C50C-407E-A947-70E740481C1C}">
+                <a14:useLocalDpi xmlns:a14="http://schemas.microsoft.com/office/drawing/2010/main" val="0"/>
+              </a:ext>
+            </a:extLst>
+          </a:blip>
+          <a:stretch>
+            <a:fillRect/>
+          </a:stretch>
+        </p:blipFill>
+        <p:spPr>
+          <a:xfrm>
+            <a:off x="5299072" y="4324352"/>
+            <a:ext cx="1080000" cy="1080000"/>
+          </a:xfrm>
+          <a:prstGeom prst="rect">
+            <a:avLst/>
+          </a:prstGeom>
+        </p:spPr>
+      </p:pic>
+      <p:pic>
+        <p:nvPicPr>
+          <p:cNvPr id="10" name="Picture 9"/>
+          <p:cNvPicPr>
+            <a:picLocks noChangeAspect="1"/>
+          </p:cNvPicPr>
+          <p:nvPr/>
+        </p:nvPicPr>
+        <p:blipFill>
+          <a:blip r:embed="rId4">
+            <a:extLst>
+              <a:ext uri="{28A0092B-C50C-407E-A947-70E740481C1C}">
+                <a14:useLocalDpi xmlns:a14="http://schemas.microsoft.com/office/drawing/2010/main" val="0"/>
+              </a:ext>
+            </a:extLst>
+          </a:blip>
+          <a:stretch>
+            <a:fillRect/>
+          </a:stretch>
+        </p:blipFill>
+        <p:spPr>
+          <a:xfrm>
+            <a:off x="5324221" y="1759463"/>
+            <a:ext cx="1080000" cy="1080000"/>
+          </a:xfrm>
+          <a:prstGeom prst="rect">
+            <a:avLst/>
+          </a:prstGeom>
+        </p:spPr>
+      </p:pic>
+      <p:pic>
+        <p:nvPicPr>
+          <p:cNvPr id="11" name="Picture 10"/>
+          <p:cNvPicPr>
+            <a:picLocks noChangeAspect="1"/>
+          </p:cNvPicPr>
+          <p:nvPr/>
+        </p:nvPicPr>
+        <p:blipFill>
+          <a:blip r:embed="rId5">
+            <a:extLst>
+              <a:ext uri="{28A0092B-C50C-407E-A947-70E740481C1C}">
+                <a14:useLocalDpi xmlns:a14="http://schemas.microsoft.com/office/drawing/2010/main" val="0"/>
+              </a:ext>
+            </a:extLst>
+          </a:blip>
+          <a:stretch>
+            <a:fillRect/>
+          </a:stretch>
+        </p:blipFill>
+        <p:spPr>
+          <a:xfrm>
+            <a:off x="2502151" y="1759463"/>
+            <a:ext cx="1080000" cy="1080000"/>
+          </a:xfrm>
+          <a:prstGeom prst="rect">
+            <a:avLst/>
+          </a:prstGeom>
+        </p:spPr>
+      </p:pic>
+      <p:sp>
+        <p:nvSpPr>
+          <p:cNvPr id="12" name="TextBox 11"/>
+          <p:cNvSpPr txBox="1"/>
+          <p:nvPr/>
+        </p:nvSpPr>
+        <p:spPr>
+          <a:xfrm>
+            <a:off x="2410322" y="2839461"/>
+            <a:ext cx="1269498" cy="369332"/>
+          </a:xfrm>
+          <a:prstGeom prst="rect">
+            <a:avLst/>
+          </a:prstGeom>
+          <a:noFill/>
+        </p:spPr>
+        <p:txBody>
+          <a:bodyPr wrap="square" rtlCol="0">
+            <a:spAutoFit/>
+          </a:bodyPr>
+          <a:lstStyle/>
+          <a:p>
+            <a:pPr algn="ctr"/>
+            <a:r>
+              <a:rPr lang="en-US" dirty="0" smtClean="0">
+                <a:solidFill>
+                  <a:schemeClr val="bg1"/>
+                </a:solidFill>
+              </a:rPr>
+              <a:t>Web Page</a:t>
+            </a:r>
+            <a:endParaRPr lang="en-US" dirty="0">
+              <a:solidFill>
+                <a:schemeClr val="bg1"/>
+              </a:solidFill>
+            </a:endParaRPr>
+          </a:p>
+        </p:txBody>
+      </p:sp>
+      <p:sp>
+        <p:nvSpPr>
+          <p:cNvPr id="13" name="TextBox 12"/>
+          <p:cNvSpPr txBox="1"/>
+          <p:nvPr/>
+        </p:nvSpPr>
+        <p:spPr>
+          <a:xfrm>
+            <a:off x="5040558" y="2839463"/>
+            <a:ext cx="1690442" cy="369332"/>
+          </a:xfrm>
+          <a:prstGeom prst="rect">
+            <a:avLst/>
+          </a:prstGeom>
+          <a:noFill/>
+        </p:spPr>
+        <p:txBody>
+          <a:bodyPr wrap="square" rtlCol="0">
+            <a:spAutoFit/>
+          </a:bodyPr>
+          <a:lstStyle/>
+          <a:p>
+            <a:pPr algn="ctr"/>
+            <a:r>
+              <a:rPr lang="en-US" dirty="0" smtClean="0">
+                <a:solidFill>
+                  <a:schemeClr val="bg1"/>
+                </a:solidFill>
+              </a:rPr>
+              <a:t>Service Worker</a:t>
+            </a:r>
+            <a:endParaRPr lang="en-US" dirty="0">
+              <a:solidFill>
+                <a:schemeClr val="bg1"/>
+              </a:solidFill>
+            </a:endParaRPr>
+          </a:p>
+        </p:txBody>
+      </p:sp>
+      <p:pic>
+        <p:nvPicPr>
+          <p:cNvPr id="15" name="Picture 14"/>
+          <p:cNvPicPr>
+            <a:picLocks noChangeAspect="1"/>
+          </p:cNvPicPr>
+          <p:nvPr/>
+        </p:nvPicPr>
+        <p:blipFill>
+          <a:blip r:embed="rId6">
+            <a:extLst>
+              <a:ext uri="{28A0092B-C50C-407E-A947-70E740481C1C}">
+                <a14:useLocalDpi xmlns:a14="http://schemas.microsoft.com/office/drawing/2010/main" val="0"/>
+              </a:ext>
+            </a:extLst>
+          </a:blip>
+          <a:stretch>
+            <a:fillRect/>
+          </a:stretch>
+        </p:blipFill>
+        <p:spPr>
+          <a:xfrm>
+            <a:off x="8674100" y="1759463"/>
+            <a:ext cx="1080000" cy="1080000"/>
+          </a:xfrm>
+          <a:prstGeom prst="rect">
+            <a:avLst/>
+          </a:prstGeom>
+        </p:spPr>
+      </p:pic>
+      <p:sp>
+        <p:nvSpPr>
+          <p:cNvPr id="17" name="TextBox 16"/>
+          <p:cNvSpPr txBox="1"/>
+          <p:nvPr/>
+        </p:nvSpPr>
+        <p:spPr>
+          <a:xfrm>
+            <a:off x="5273923" y="5454651"/>
+            <a:ext cx="1130298" cy="369332"/>
+          </a:xfrm>
+          <a:prstGeom prst="rect">
+            <a:avLst/>
+          </a:prstGeom>
+          <a:noFill/>
+        </p:spPr>
+        <p:txBody>
+          <a:bodyPr wrap="square" rtlCol="0">
+            <a:spAutoFit/>
+          </a:bodyPr>
+          <a:lstStyle/>
+          <a:p>
+            <a:pPr algn="ctr"/>
+            <a:r>
+              <a:rPr lang="en-US" dirty="0" smtClean="0">
+                <a:solidFill>
+                  <a:schemeClr val="bg1"/>
+                </a:solidFill>
+              </a:rPr>
+              <a:t>Cache</a:t>
+            </a:r>
+            <a:endParaRPr lang="en-US" dirty="0">
+              <a:solidFill>
+                <a:schemeClr val="bg1"/>
+              </a:solidFill>
+            </a:endParaRPr>
+          </a:p>
+        </p:txBody>
+      </p:sp>
+      <p:sp>
+        <p:nvSpPr>
+          <p:cNvPr id="18" name="TextBox 17"/>
+          <p:cNvSpPr txBox="1"/>
+          <p:nvPr/>
+        </p:nvSpPr>
+        <p:spPr>
+          <a:xfrm>
+            <a:off x="8415586" y="2834126"/>
+            <a:ext cx="1597028" cy="369332"/>
+          </a:xfrm>
+          <a:prstGeom prst="rect">
+            <a:avLst/>
+          </a:prstGeom>
+          <a:noFill/>
+        </p:spPr>
+        <p:txBody>
+          <a:bodyPr wrap="square" rtlCol="0">
+            <a:spAutoFit/>
+          </a:bodyPr>
+          <a:lstStyle/>
+          <a:p>
+            <a:pPr algn="ctr"/>
+            <a:r>
+              <a:rPr lang="en-US" dirty="0" smtClean="0">
+                <a:solidFill>
+                  <a:schemeClr val="bg1"/>
+                </a:solidFill>
+              </a:rPr>
+              <a:t>Network</a:t>
+            </a:r>
+          </a:p>
+        </p:txBody>
+      </p:sp>
+      <p:cxnSp>
+        <p:nvCxnSpPr>
+          <p:cNvPr id="20" name="Straight Arrow Connector 19"/>
+          <p:cNvCxnSpPr/>
+          <p:nvPr/>
+        </p:nvCxnSpPr>
+        <p:spPr>
+          <a:xfrm>
+            <a:off x="3746500" y="2299463"/>
+            <a:ext cx="1294058" cy="0"/>
+          </a:xfrm>
+          <a:prstGeom prst="straightConnector1">
+            <a:avLst/>
+          </a:prstGeom>
+          <a:ln w="38100">
+            <a:solidFill>
+              <a:schemeClr val="bg1"/>
+            </a:solidFill>
+            <a:headEnd type="none" w="med" len="med"/>
+            <a:tailEnd type="triangle" w="med" len="med"/>
+          </a:ln>
+        </p:spPr>
+        <p:style>
+          <a:lnRef idx="1">
+            <a:schemeClr val="accent1"/>
+          </a:lnRef>
+          <a:fillRef idx="0">
+            <a:schemeClr val="accent1"/>
+          </a:fillRef>
+          <a:effectRef idx="0">
+            <a:schemeClr val="accent1"/>
+          </a:effectRef>
+          <a:fontRef idx="minor">
+            <a:schemeClr val="tx1"/>
+          </a:fontRef>
+        </p:style>
+      </p:cxnSp>
+      <p:cxnSp>
+        <p:nvCxnSpPr>
+          <p:cNvPr id="23" name="Straight Arrow Connector 22"/>
+          <p:cNvCxnSpPr/>
+          <p:nvPr/>
+        </p:nvCxnSpPr>
+        <p:spPr>
+          <a:xfrm flipV="1">
+            <a:off x="6637586" y="2299463"/>
+            <a:ext cx="1778000" cy="13463"/>
+          </a:xfrm>
+          <a:prstGeom prst="straightConnector1">
+            <a:avLst/>
+          </a:prstGeom>
+          <a:ln w="38100">
+            <a:solidFill>
+              <a:schemeClr val="bg1"/>
+            </a:solidFill>
+            <a:prstDash val="sysDash"/>
+            <a:headEnd type="none" w="med" len="med"/>
+            <a:tailEnd type="triangle" w="med" len="med"/>
+          </a:ln>
+        </p:spPr>
+        <p:style>
+          <a:lnRef idx="1">
+            <a:schemeClr val="accent1"/>
+          </a:lnRef>
+          <a:fillRef idx="0">
+            <a:schemeClr val="accent1"/>
+          </a:fillRef>
+          <a:effectRef idx="0">
+            <a:schemeClr val="accent1"/>
+          </a:effectRef>
+          <a:fontRef idx="minor">
+            <a:schemeClr val="tx1"/>
+          </a:fontRef>
+        </p:style>
+      </p:cxnSp>
+      <p:cxnSp>
+        <p:nvCxnSpPr>
+          <p:cNvPr id="28" name="Straight Arrow Connector 27"/>
+          <p:cNvCxnSpPr/>
+          <p:nvPr/>
+        </p:nvCxnSpPr>
+        <p:spPr>
+          <a:xfrm>
+            <a:off x="5839072" y="3340100"/>
+            <a:ext cx="0" cy="800100"/>
+          </a:xfrm>
+          <a:prstGeom prst="straightConnector1">
+            <a:avLst/>
+          </a:prstGeom>
+          <a:ln w="38100">
+            <a:solidFill>
+              <a:schemeClr val="bg1"/>
+            </a:solidFill>
+            <a:headEnd type="none" w="med" len="med"/>
+            <a:tailEnd type="triangle" w="med" len="med"/>
+          </a:ln>
+        </p:spPr>
+        <p:style>
+          <a:lnRef idx="1">
+            <a:schemeClr val="accent1"/>
+          </a:lnRef>
+          <a:fillRef idx="0">
+            <a:schemeClr val="accent1"/>
+          </a:fillRef>
+          <a:effectRef idx="0">
+            <a:schemeClr val="accent1"/>
+          </a:effectRef>
+          <a:fontRef idx="minor">
+            <a:schemeClr val="tx1"/>
+          </a:fontRef>
+        </p:style>
+      </p:cxnSp>
+      <p:cxnSp>
+        <p:nvCxnSpPr>
+          <p:cNvPr id="3" name="Straight Connector 2"/>
+          <p:cNvCxnSpPr/>
+          <p:nvPr/>
+        </p:nvCxnSpPr>
+        <p:spPr>
+          <a:xfrm>
+            <a:off x="7366000" y="1168400"/>
+            <a:ext cx="0" cy="4800600"/>
+          </a:xfrm>
+          <a:prstGeom prst="line">
+            <a:avLst/>
+          </a:prstGeom>
+          <a:ln w="28575">
+            <a:solidFill>
+              <a:schemeClr val="bg1">
+                <a:lumMod val="75000"/>
+              </a:schemeClr>
+            </a:solidFill>
+            <a:prstDash val="dashDot"/>
+          </a:ln>
+        </p:spPr>
+        <p:style>
+          <a:lnRef idx="1">
+            <a:schemeClr val="accent1"/>
+          </a:lnRef>
+          <a:fillRef idx="0">
+            <a:schemeClr val="accent1"/>
+          </a:fillRef>
+          <a:effectRef idx="0">
+            <a:schemeClr val="accent1"/>
+          </a:effectRef>
+          <a:fontRef idx="minor">
+            <a:schemeClr val="tx1"/>
+          </a:fontRef>
+        </p:style>
+      </p:cxnSp>
+      <p:sp>
+        <p:nvSpPr>
+          <p:cNvPr id="4" name="TextBox 3"/>
+          <p:cNvSpPr txBox="1"/>
+          <p:nvPr/>
+        </p:nvSpPr>
+        <p:spPr>
+          <a:xfrm>
+            <a:off x="4279884" y="1943594"/>
+            <a:ext cx="301686" cy="369332"/>
+          </a:xfrm>
+          <a:prstGeom prst="rect">
+            <a:avLst/>
+          </a:prstGeom>
+          <a:noFill/>
+        </p:spPr>
+        <p:txBody>
+          <a:bodyPr wrap="none" rtlCol="0">
+            <a:spAutoFit/>
+          </a:bodyPr>
+          <a:lstStyle/>
+          <a:p>
+            <a:r>
+              <a:rPr lang="en-US" dirty="0" smtClean="0">
+                <a:solidFill>
+                  <a:schemeClr val="bg1"/>
+                </a:solidFill>
+              </a:rPr>
+              <a:t>1</a:t>
+            </a:r>
+            <a:endParaRPr lang="en-US" dirty="0">
+              <a:solidFill>
+                <a:schemeClr val="bg1"/>
+              </a:solidFill>
+            </a:endParaRPr>
+          </a:p>
+        </p:txBody>
+      </p:sp>
+      <p:sp>
+        <p:nvSpPr>
+          <p:cNvPr id="16" name="TextBox 15"/>
+          <p:cNvSpPr txBox="1"/>
+          <p:nvPr/>
+        </p:nvSpPr>
+        <p:spPr>
+          <a:xfrm>
+            <a:off x="5473580" y="3547637"/>
+            <a:ext cx="301686" cy="369332"/>
+          </a:xfrm>
+          <a:prstGeom prst="rect">
+            <a:avLst/>
+          </a:prstGeom>
+          <a:noFill/>
+        </p:spPr>
+        <p:txBody>
+          <a:bodyPr wrap="none" rtlCol="0">
+            <a:spAutoFit/>
+          </a:bodyPr>
+          <a:lstStyle/>
+          <a:p>
+            <a:r>
+              <a:rPr lang="en-US" dirty="0" smtClean="0">
+                <a:solidFill>
+                  <a:schemeClr val="bg1"/>
+                </a:solidFill>
+              </a:rPr>
+              <a:t>2</a:t>
+            </a:r>
+            <a:endParaRPr lang="en-US" dirty="0">
+              <a:solidFill>
+                <a:schemeClr val="bg1"/>
+              </a:solidFill>
+            </a:endParaRPr>
+          </a:p>
+        </p:txBody>
+      </p:sp>
+      <p:sp>
+        <p:nvSpPr>
+          <p:cNvPr id="19" name="TextBox 18"/>
+          <p:cNvSpPr txBox="1"/>
+          <p:nvPr/>
+        </p:nvSpPr>
+        <p:spPr>
+          <a:xfrm>
+            <a:off x="7396202" y="1944088"/>
+            <a:ext cx="301686" cy="369332"/>
+          </a:xfrm>
+          <a:prstGeom prst="rect">
+            <a:avLst/>
+          </a:prstGeom>
+          <a:noFill/>
+        </p:spPr>
+        <p:txBody>
+          <a:bodyPr wrap="none" rtlCol="0">
+            <a:spAutoFit/>
+          </a:bodyPr>
+          <a:lstStyle/>
+          <a:p>
+            <a:r>
+              <a:rPr lang="en-US" dirty="0" smtClean="0">
+                <a:solidFill>
+                  <a:schemeClr val="bg1"/>
+                </a:solidFill>
+              </a:rPr>
+              <a:t>4</a:t>
+            </a:r>
+            <a:endParaRPr lang="en-US" dirty="0">
+              <a:solidFill>
+                <a:schemeClr val="bg1"/>
+              </a:solidFill>
+            </a:endParaRPr>
+          </a:p>
+        </p:txBody>
+      </p:sp>
+      <p:cxnSp>
+        <p:nvCxnSpPr>
+          <p:cNvPr id="6" name="Curved Connector 5"/>
+          <p:cNvCxnSpPr>
+            <a:endCxn id="12" idx="2"/>
+          </p:cNvCxnSpPr>
+          <p:nvPr/>
+        </p:nvCxnSpPr>
+        <p:spPr>
+          <a:xfrm rot="10800000">
+            <a:off x="3045072" y="3208794"/>
+            <a:ext cx="2019053" cy="1655309"/>
+          </a:xfrm>
+          <a:prstGeom prst="curvedConnector2">
+            <a:avLst/>
+          </a:prstGeom>
+          <a:ln w="38100">
+            <a:solidFill>
+              <a:schemeClr val="bg1"/>
+            </a:solidFill>
+            <a:tailEnd type="triangle"/>
+          </a:ln>
+        </p:spPr>
+        <p:style>
+          <a:lnRef idx="1">
+            <a:schemeClr val="accent1"/>
+          </a:lnRef>
+          <a:fillRef idx="0">
+            <a:schemeClr val="accent1"/>
+          </a:fillRef>
+          <a:effectRef idx="0">
+            <a:schemeClr val="accent1"/>
+          </a:effectRef>
+          <a:fontRef idx="minor">
+            <a:schemeClr val="tx1"/>
+          </a:fontRef>
+        </p:style>
+      </p:cxnSp>
+      <p:sp>
+        <p:nvSpPr>
+          <p:cNvPr id="21" name="TextBox 20"/>
+          <p:cNvSpPr txBox="1"/>
+          <p:nvPr/>
+        </p:nvSpPr>
+        <p:spPr>
+          <a:xfrm>
+            <a:off x="3305614" y="4331723"/>
+            <a:ext cx="301686" cy="369332"/>
+          </a:xfrm>
+          <a:prstGeom prst="rect">
+            <a:avLst/>
+          </a:prstGeom>
+          <a:noFill/>
+        </p:spPr>
+        <p:txBody>
+          <a:bodyPr wrap="none" rtlCol="0">
+            <a:spAutoFit/>
+          </a:bodyPr>
+          <a:lstStyle/>
+          <a:p>
+            <a:r>
+              <a:rPr lang="en-US" dirty="0" smtClean="0">
+                <a:solidFill>
+                  <a:schemeClr val="bg1"/>
+                </a:solidFill>
+              </a:rPr>
+              <a:t>3</a:t>
+            </a:r>
+            <a:endParaRPr lang="en-US" dirty="0">
+              <a:solidFill>
+                <a:schemeClr val="bg1"/>
+              </a:solidFill>
+            </a:endParaRPr>
+          </a:p>
+        </p:txBody>
+      </p:sp>
+      <p:cxnSp>
+        <p:nvCxnSpPr>
+          <p:cNvPr id="22" name="Curved Connector 21"/>
+          <p:cNvCxnSpPr>
+            <a:stCxn id="18" idx="2"/>
+          </p:cNvCxnSpPr>
+          <p:nvPr/>
+        </p:nvCxnSpPr>
+        <p:spPr>
+          <a:xfrm rot="5400000">
+            <a:off x="7058758" y="2708760"/>
+            <a:ext cx="1660645" cy="2650041"/>
+          </a:xfrm>
+          <a:prstGeom prst="curvedConnector2">
+            <a:avLst/>
+          </a:prstGeom>
+          <a:ln w="38100">
+            <a:solidFill>
+              <a:schemeClr val="bg1"/>
+            </a:solidFill>
+            <a:prstDash val="sysDash"/>
+            <a:tailEnd type="triangle"/>
+          </a:ln>
+        </p:spPr>
+        <p:style>
+          <a:lnRef idx="1">
+            <a:schemeClr val="accent1"/>
+          </a:lnRef>
+          <a:fillRef idx="0">
+            <a:schemeClr val="accent1"/>
+          </a:fillRef>
+          <a:effectRef idx="0">
+            <a:schemeClr val="accent1"/>
+          </a:effectRef>
+          <a:fontRef idx="minor">
+            <a:schemeClr val="tx1"/>
+          </a:fontRef>
+        </p:style>
+      </p:cxnSp>
+      <p:sp>
+        <p:nvSpPr>
+          <p:cNvPr id="25" name="TextBox 24"/>
+          <p:cNvSpPr txBox="1"/>
+          <p:nvPr/>
+        </p:nvSpPr>
+        <p:spPr>
+          <a:xfrm>
+            <a:off x="8327780" y="4324352"/>
+            <a:ext cx="301686" cy="369332"/>
+          </a:xfrm>
+          <a:prstGeom prst="rect">
+            <a:avLst/>
+          </a:prstGeom>
+          <a:noFill/>
+        </p:spPr>
+        <p:txBody>
+          <a:bodyPr wrap="none" rtlCol="0">
+            <a:spAutoFit/>
+          </a:bodyPr>
+          <a:lstStyle/>
+          <a:p>
+            <a:r>
+              <a:rPr lang="en-US" dirty="0" smtClean="0">
+                <a:solidFill>
+                  <a:schemeClr val="bg1"/>
+                </a:solidFill>
+              </a:rPr>
+              <a:t>5</a:t>
+            </a:r>
+            <a:endParaRPr lang="en-US" dirty="0">
+              <a:solidFill>
+                <a:schemeClr val="bg1"/>
+              </a:solidFill>
+            </a:endParaRPr>
+          </a:p>
+        </p:txBody>
+      </p:sp>
+    </p:spTree>
+    <p:extLst>
+      <p:ext uri="{BB962C8B-B14F-4D97-AF65-F5344CB8AC3E}">
+        <p14:creationId xmlns:p14="http://schemas.microsoft.com/office/powerpoint/2010/main" val="426065150"/>
+      </p:ext>
+    </p:extLst>
+  </p:cSld>
+  <p:clrMapOvr>
+    <a:masterClrMapping/>
+  </p:clrMapOvr>
 </p:sld>
 </file>
 

</xml_diff>